<commit_message>
Mise à jour tutos
</commit_message>
<xml_diff>
--- a/Tuto_decoup_TWAV.pptx
+++ b/Tuto_decoup_TWAV.pptx
@@ -7,10 +7,11 @@
   <p:sldIdLst>
     <p:sldId id="262" r:id="rId2"/>
     <p:sldId id="256" r:id="rId3"/>
-    <p:sldId id="258" r:id="rId4"/>
-    <p:sldId id="257" r:id="rId5"/>
-    <p:sldId id="260" r:id="rId6"/>
-    <p:sldId id="261" r:id="rId7"/>
+    <p:sldId id="263" r:id="rId4"/>
+    <p:sldId id="258" r:id="rId5"/>
+    <p:sldId id="257" r:id="rId6"/>
+    <p:sldId id="260" r:id="rId7"/>
+    <p:sldId id="261" r:id="rId8"/>
   </p:sldIdLst>
   <p:sldSz cx="12192000" cy="6858000"/>
   <p:notesSz cx="6858000" cy="9144000"/>
@@ -264,7 +265,7 @@
           <a:p>
             <a:fld id="{2A59F47B-E7C1-4F23-BE41-37F7E26DCCF7}" type="datetimeFigureOut">
               <a:rPr lang="fr-FR" smtClean="0"/>
-              <a:t>09/05/2023</a:t>
+              <a:t>26/05/2023</a:t>
             </a:fld>
             <a:endParaRPr lang="fr-FR"/>
           </a:p>
@@ -462,7 +463,7 @@
           <a:p>
             <a:fld id="{2A59F47B-E7C1-4F23-BE41-37F7E26DCCF7}" type="datetimeFigureOut">
               <a:rPr lang="fr-FR" smtClean="0"/>
-              <a:t>09/05/2023</a:t>
+              <a:t>26/05/2023</a:t>
             </a:fld>
             <a:endParaRPr lang="fr-FR"/>
           </a:p>
@@ -670,7 +671,7 @@
           <a:p>
             <a:fld id="{2A59F47B-E7C1-4F23-BE41-37F7E26DCCF7}" type="datetimeFigureOut">
               <a:rPr lang="fr-FR" smtClean="0"/>
-              <a:t>09/05/2023</a:t>
+              <a:t>26/05/2023</a:t>
             </a:fld>
             <a:endParaRPr lang="fr-FR"/>
           </a:p>
@@ -868,7 +869,7 @@
           <a:p>
             <a:fld id="{2A59F47B-E7C1-4F23-BE41-37F7E26DCCF7}" type="datetimeFigureOut">
               <a:rPr lang="fr-FR" smtClean="0"/>
-              <a:t>09/05/2023</a:t>
+              <a:t>26/05/2023</a:t>
             </a:fld>
             <a:endParaRPr lang="fr-FR"/>
           </a:p>
@@ -1143,7 +1144,7 @@
           <a:p>
             <a:fld id="{2A59F47B-E7C1-4F23-BE41-37F7E26DCCF7}" type="datetimeFigureOut">
               <a:rPr lang="fr-FR" smtClean="0"/>
-              <a:t>09/05/2023</a:t>
+              <a:t>26/05/2023</a:t>
             </a:fld>
             <a:endParaRPr lang="fr-FR"/>
           </a:p>
@@ -1408,7 +1409,7 @@
           <a:p>
             <a:fld id="{2A59F47B-E7C1-4F23-BE41-37F7E26DCCF7}" type="datetimeFigureOut">
               <a:rPr lang="fr-FR" smtClean="0"/>
-              <a:t>09/05/2023</a:t>
+              <a:t>26/05/2023</a:t>
             </a:fld>
             <a:endParaRPr lang="fr-FR"/>
           </a:p>
@@ -1820,7 +1821,7 @@
           <a:p>
             <a:fld id="{2A59F47B-E7C1-4F23-BE41-37F7E26DCCF7}" type="datetimeFigureOut">
               <a:rPr lang="fr-FR" smtClean="0"/>
-              <a:t>09/05/2023</a:t>
+              <a:t>26/05/2023</a:t>
             </a:fld>
             <a:endParaRPr lang="fr-FR"/>
           </a:p>
@@ -1961,7 +1962,7 @@
           <a:p>
             <a:fld id="{2A59F47B-E7C1-4F23-BE41-37F7E26DCCF7}" type="datetimeFigureOut">
               <a:rPr lang="fr-FR" smtClean="0"/>
-              <a:t>09/05/2023</a:t>
+              <a:t>26/05/2023</a:t>
             </a:fld>
             <a:endParaRPr lang="fr-FR"/>
           </a:p>
@@ -2074,7 +2075,7 @@
           <a:p>
             <a:fld id="{2A59F47B-E7C1-4F23-BE41-37F7E26DCCF7}" type="datetimeFigureOut">
               <a:rPr lang="fr-FR" smtClean="0"/>
-              <a:t>09/05/2023</a:t>
+              <a:t>26/05/2023</a:t>
             </a:fld>
             <a:endParaRPr lang="fr-FR"/>
           </a:p>
@@ -2385,7 +2386,7 @@
           <a:p>
             <a:fld id="{2A59F47B-E7C1-4F23-BE41-37F7E26DCCF7}" type="datetimeFigureOut">
               <a:rPr lang="fr-FR" smtClean="0"/>
-              <a:t>09/05/2023</a:t>
+              <a:t>26/05/2023</a:t>
             </a:fld>
             <a:endParaRPr lang="fr-FR"/>
           </a:p>
@@ -2673,7 +2674,7 @@
           <a:p>
             <a:fld id="{2A59F47B-E7C1-4F23-BE41-37F7E26DCCF7}" type="datetimeFigureOut">
               <a:rPr lang="fr-FR" smtClean="0"/>
-              <a:t>09/05/2023</a:t>
+              <a:t>26/05/2023</a:t>
             </a:fld>
             <a:endParaRPr lang="fr-FR"/>
           </a:p>
@@ -2914,7 +2915,7 @@
           <a:p>
             <a:fld id="{2A59F47B-E7C1-4F23-BE41-37F7E26DCCF7}" type="datetimeFigureOut">
               <a:rPr lang="fr-FR" smtClean="0"/>
-              <a:t>09/05/2023</a:t>
+              <a:t>26/05/2023</a:t>
             </a:fld>
             <a:endParaRPr lang="fr-FR"/>
           </a:p>
@@ -3471,15 +3472,7 @@
             </a:br>
             <a:r>
               <a:rPr lang="fr-FR" dirty="0"/>
-              <a:t>Ce script permet de découper les T.Wav en .</a:t>
-            </a:r>
-            <a:r>
-              <a:rPr lang="fr-FR" dirty="0" err="1"/>
-              <a:t>Wav</a:t>
-            </a:r>
-            <a:r>
-              <a:rPr lang="fr-FR" dirty="0"/>
-              <a:t> quelle que soit l’arborescence de vos dossiers.</a:t>
+              <a:t>Ce script permet de découper les T.Wav en .Wav quelle que soit l’arborescence de vos dossiers.</a:t>
             </a:r>
           </a:p>
           <a:p>
@@ -3491,21 +3484,8 @@
           <a:p>
             <a:r>
               <a:rPr lang="fr-FR" dirty="0"/>
-              <a:t>Le script copie l’arborescence des dossiers contenant des fichiers </a:t>
-            </a:r>
-            <a:r>
-              <a:rPr lang="fr-FR" dirty="0" err="1"/>
-              <a:t>T.Wav</a:t>
-            </a:r>
-            <a:r>
-              <a:rPr lang="fr-FR" dirty="0"/>
-              <a:t> et les remplace par des .</a:t>
-            </a:r>
-            <a:r>
-              <a:rPr lang="fr-FR" dirty="0" err="1"/>
-              <a:t>Wav</a:t>
-            </a:r>
-            <a:endParaRPr lang="fr-FR" dirty="0"/>
+              <a:t>Le script copie l’arborescence des dossiers contenant des fichiers T.Wav et les remplace par des .Wav</a:t>
+            </a:r>
           </a:p>
         </p:txBody>
       </p:sp>
@@ -3669,7 +3649,7 @@
         <p:spPr>
           <a:xfrm>
             <a:off x="797979" y="2860962"/>
-            <a:ext cx="11190243" cy="3785652"/>
+            <a:ext cx="11190243" cy="3508653"/>
           </a:xfrm>
           <a:prstGeom prst="rect">
             <a:avLst/>
@@ -3725,33 +3705,7 @@
             <a:endParaRPr lang="fr-FR" dirty="0"/>
           </a:p>
           <a:p>
-            <a:pPr marL="742950" lvl="1" indent="-285750">
-              <a:buFont typeface="Arial" panose="020B0604020202020204" pitchFamily="34" charset="0"/>
-              <a:buChar char="•"/>
-            </a:pPr>
-            <a:r>
-              <a:rPr lang="fr-FR" dirty="0"/>
-              <a:t>Télécharger le dossier « TWAV_splitter » (350 Mo) : </a:t>
-            </a:r>
-            <a:r>
-              <a:rPr lang="fr-FR" dirty="0" err="1">
-                <a:solidFill>
-                  <a:srgbClr val="0563C1"/>
-                </a:solidFill>
-              </a:rPr>
-              <a:t>lien_github</a:t>
-            </a:r>
-            <a:endParaRPr lang="fr-FR" dirty="0">
-              <a:solidFill>
-                <a:srgbClr val="0563C1"/>
-              </a:solidFill>
-            </a:endParaRPr>
-          </a:p>
-          <a:p>
-            <a:pPr marL="742950" lvl="1" indent="-285750">
-              <a:buFont typeface="Arial" panose="020B0604020202020204" pitchFamily="34" charset="0"/>
-              <a:buChar char="•"/>
-            </a:pPr>
+            <a:pPr lvl="1"/>
             <a:endParaRPr lang="fr-FR" dirty="0"/>
           </a:p>
           <a:p>
@@ -3773,15 +3727,7 @@
             </a:r>
             <a:r>
               <a:rPr lang="fr-FR" dirty="0"/>
-              <a:t>qui contient tous les fichiers </a:t>
-            </a:r>
-            <a:r>
-              <a:rPr lang="fr-FR" dirty="0" err="1"/>
-              <a:t>T.Wav</a:t>
-            </a:r>
-            <a:r>
-              <a:rPr lang="fr-FR" dirty="0"/>
-              <a:t> </a:t>
+              <a:t>qui contient tous les fichiers T.Wav </a:t>
             </a:r>
             <a:r>
               <a:rPr lang="fr-FR" b="1" dirty="0"/>
@@ -3937,12 +3883,92 @@
           <a:chExt cx="0" cy="0"/>
         </a:xfrm>
       </p:grpSpPr>
+      <p:sp>
+        <p:nvSpPr>
+          <p:cNvPr id="6" name="ZoneTexte 5">
+            <a:extLst>
+              <a:ext uri="{FF2B5EF4-FFF2-40B4-BE49-F238E27FC236}">
+                <a16:creationId xmlns:a16="http://schemas.microsoft.com/office/drawing/2014/main" id="{37B338AB-5BD3-10FD-5BC4-C19462AA0371}"/>
+              </a:ext>
+            </a:extLst>
+          </p:cNvPr>
+          <p:cNvSpPr txBox="1"/>
+          <p:nvPr/>
+        </p:nvSpPr>
+        <p:spPr>
+          <a:xfrm>
+            <a:off x="504203" y="688885"/>
+            <a:ext cx="7583936" cy="461665"/>
+          </a:xfrm>
+          <a:prstGeom prst="rect">
+            <a:avLst/>
+          </a:prstGeom>
+          <a:noFill/>
+        </p:spPr>
+        <p:txBody>
+          <a:bodyPr wrap="none" rtlCol="0">
+            <a:spAutoFit/>
+          </a:bodyPr>
+          <a:lstStyle/>
+          <a:p>
+            <a:r>
+              <a:rPr lang="fr-FR" sz="2400" b="1" dirty="0"/>
+              <a:t>1. Télécharger le script « TWAV_splitter-main » sur GitHub</a:t>
+            </a:r>
+          </a:p>
+        </p:txBody>
+      </p:sp>
+      <p:sp>
+        <p:nvSpPr>
+          <p:cNvPr id="9" name="ZoneTexte 8">
+            <a:extLst>
+              <a:ext uri="{FF2B5EF4-FFF2-40B4-BE49-F238E27FC236}">
+                <a16:creationId xmlns:a16="http://schemas.microsoft.com/office/drawing/2014/main" id="{122A2EB6-AAD3-A287-CBAE-B9551BA5A115}"/>
+              </a:ext>
+            </a:extLst>
+          </p:cNvPr>
+          <p:cNvSpPr txBox="1"/>
+          <p:nvPr/>
+        </p:nvSpPr>
+        <p:spPr>
+          <a:xfrm>
+            <a:off x="504203" y="1471548"/>
+            <a:ext cx="4288162" cy="646331"/>
+          </a:xfrm>
+          <a:prstGeom prst="rect">
+            <a:avLst/>
+          </a:prstGeom>
+          <a:noFill/>
+        </p:spPr>
+        <p:txBody>
+          <a:bodyPr wrap="none" rtlCol="0">
+            <a:spAutoFit/>
+          </a:bodyPr>
+          <a:lstStyle/>
+          <a:p>
+            <a:r>
+              <a:rPr lang="fr-FR" dirty="0"/>
+              <a:t>Rendez-vous sur le site : </a:t>
+            </a:r>
+            <a:br>
+              <a:rPr lang="fr-FR" dirty="0"/>
+            </a:br>
+            <a:r>
+              <a:rPr lang="fr-FR" dirty="0">
+                <a:hlinkClick r:id="rId2"/>
+              </a:rPr>
+              <a:t>https://github.com/CEREMA/TWAV_splitter</a:t>
+            </a:r>
+            <a:endParaRPr lang="fr-FR" dirty="0"/>
+          </a:p>
+        </p:txBody>
+      </p:sp>
       <p:grpSp>
         <p:nvGrpSpPr>
-          <p:cNvPr id="17" name="Groupe 16">
-            <a:extLst>
-              <a:ext uri="{FF2B5EF4-FFF2-40B4-BE49-F238E27FC236}">
-                <a16:creationId xmlns:a16="http://schemas.microsoft.com/office/drawing/2014/main" id="{66E030AF-4FCA-AA85-8F24-A545383072DA}"/>
+          <p:cNvPr id="13" name="Groupe 12">
+            <a:extLst>
+              <a:ext uri="{FF2B5EF4-FFF2-40B4-BE49-F238E27FC236}">
+                <a16:creationId xmlns:a16="http://schemas.microsoft.com/office/drawing/2014/main" id="{2F64A28C-EC00-F834-E863-6D0902CA901E}"/>
               </a:ext>
             </a:extLst>
           </p:cNvPr>
@@ -3951,18 +3977,18 @@
         </p:nvGrpSpPr>
         <p:grpSpPr>
           <a:xfrm>
-            <a:off x="504203" y="3156726"/>
-            <a:ext cx="5040963" cy="2343458"/>
-            <a:chOff x="504203" y="1716014"/>
-            <a:chExt cx="5040963" cy="2343458"/>
+            <a:off x="504203" y="2438877"/>
+            <a:ext cx="5496547" cy="3259547"/>
+            <a:chOff x="504203" y="2161878"/>
+            <a:chExt cx="6751176" cy="4003564"/>
           </a:xfrm>
         </p:grpSpPr>
         <p:pic>
           <p:nvPicPr>
-            <p:cNvPr id="11" name="Image 10">
+            <p:cNvPr id="5" name="Image 4">
               <a:extLst>
                 <a:ext uri="{FF2B5EF4-FFF2-40B4-BE49-F238E27FC236}">
-                  <a16:creationId xmlns:a16="http://schemas.microsoft.com/office/drawing/2014/main" id="{39D4D46B-235D-2477-CCB7-1CE362341F77}"/>
+                  <a16:creationId xmlns:a16="http://schemas.microsoft.com/office/drawing/2014/main" id="{C289F919-470A-1969-EA24-EF20920E8968}"/>
                 </a:ext>
               </a:extLst>
             </p:cNvPr>
@@ -3972,32 +3998,84 @@
             <p:nvPr/>
           </p:nvPicPr>
           <p:blipFill>
-            <a:blip r:embed="rId2"/>
+            <a:blip r:embed="rId3"/>
             <a:stretch>
               <a:fillRect/>
             </a:stretch>
           </p:blipFill>
           <p:spPr>
             <a:xfrm>
-              <a:off x="504203" y="1716014"/>
-              <a:ext cx="5040963" cy="2343458"/>
+              <a:off x="504203" y="2161878"/>
+              <a:ext cx="6751176" cy="4003564"/>
             </a:xfrm>
             <a:prstGeom prst="rect">
               <a:avLst/>
             </a:prstGeom>
-            <a:ln>
+            <a:ln w="12700">
               <a:solidFill>
                 <a:schemeClr val="tx1"/>
               </a:solidFill>
             </a:ln>
           </p:spPr>
         </p:pic>
+        <p:sp>
+          <p:nvSpPr>
+            <p:cNvPr id="10" name="Rectangle 9">
+              <a:extLst>
+                <a:ext uri="{FF2B5EF4-FFF2-40B4-BE49-F238E27FC236}">
+                  <a16:creationId xmlns:a16="http://schemas.microsoft.com/office/drawing/2014/main" id="{5241C381-ADF5-F6C6-06DE-8F213A8C96CD}"/>
+                </a:ext>
+              </a:extLst>
+            </p:cNvPr>
+            <p:cNvSpPr/>
+            <p:nvPr/>
+          </p:nvSpPr>
+          <p:spPr>
+            <a:xfrm>
+              <a:off x="4852988" y="3590925"/>
+              <a:ext cx="519906" cy="233110"/>
+            </a:xfrm>
+            <a:prstGeom prst="rect">
+              <a:avLst/>
+            </a:prstGeom>
+            <a:noFill/>
+            <a:ln w="38100">
+              <a:solidFill>
+                <a:srgbClr val="FF0000"/>
+              </a:solidFill>
+            </a:ln>
+          </p:spPr>
+          <p:style>
+            <a:lnRef idx="2">
+              <a:schemeClr val="accent1">
+                <a:shade val="50000"/>
+              </a:schemeClr>
+            </a:lnRef>
+            <a:fillRef idx="1">
+              <a:schemeClr val="accent1"/>
+            </a:fillRef>
+            <a:effectRef idx="0">
+              <a:schemeClr val="accent1"/>
+            </a:effectRef>
+            <a:fontRef idx="minor">
+              <a:schemeClr val="lt1"/>
+            </a:fontRef>
+          </p:style>
+          <p:txBody>
+            <a:bodyPr rtlCol="0" anchor="ctr"/>
+            <a:lstStyle/>
+            <a:p>
+              <a:pPr algn="ctr"/>
+              <a:endParaRPr lang="fr-FR" dirty="0"/>
+            </a:p>
+          </p:txBody>
+        </p:sp>
         <p:pic>
           <p:nvPicPr>
-            <p:cNvPr id="8" name="Image 7">
+            <p:cNvPr id="11" name="Image 10">
               <a:extLst>
                 <a:ext uri="{FF2B5EF4-FFF2-40B4-BE49-F238E27FC236}">
-                  <a16:creationId xmlns:a16="http://schemas.microsoft.com/office/drawing/2014/main" id="{A4B491E4-77AC-889F-8C3B-33A820524C0E}"/>
+                  <a16:creationId xmlns:a16="http://schemas.microsoft.com/office/drawing/2014/main" id="{0552A64C-B7C5-2772-4A6E-FB66839414C1}"/>
                 </a:ext>
               </a:extLst>
             </p:cNvPr>
@@ -4007,7 +4085,7 @@
             <p:nvPr/>
           </p:nvPicPr>
           <p:blipFill>
-            <a:blip r:embed="rId3">
+            <a:blip r:embed="rId4">
               <a:extLst>
                 <a:ext uri="{28A0092B-C50C-407E-A947-70E740481C1C}">
                   <a14:useLocalDpi xmlns:a14="http://schemas.microsoft.com/office/drawing/2010/main" val="0"/>
@@ -4020,21 +4098,24 @@
           </p:blipFill>
           <p:spPr>
             <a:xfrm>
-              <a:off x="1938897" y="2115127"/>
+              <a:off x="3947159" y="5316273"/>
               <a:ext cx="280141" cy="280141"/>
             </a:xfrm>
             <a:prstGeom prst="rect">
               <a:avLst/>
             </a:prstGeom>
+            <a:ln w="12700">
+              <a:noFill/>
+            </a:ln>
           </p:spPr>
         </p:pic>
       </p:grpSp>
       <p:sp>
         <p:nvSpPr>
-          <p:cNvPr id="9" name="ZoneTexte 8">
-            <a:extLst>
-              <a:ext uri="{FF2B5EF4-FFF2-40B4-BE49-F238E27FC236}">
-                <a16:creationId xmlns:a16="http://schemas.microsoft.com/office/drawing/2014/main" id="{BE7E9142-4CA7-3DD9-6675-22A589BF34F2}"/>
+          <p:cNvPr id="12" name="ZoneTexte 11">
+            <a:extLst>
+              <a:ext uri="{FF2B5EF4-FFF2-40B4-BE49-F238E27FC236}">
+                <a16:creationId xmlns:a16="http://schemas.microsoft.com/office/drawing/2014/main" id="{C4D68A35-73B2-9204-0B13-A15FF1CBE16B}"/>
               </a:ext>
             </a:extLst>
           </p:cNvPr>
@@ -4043,8 +4124,8 @@
         </p:nvSpPr>
         <p:spPr>
           <a:xfrm>
-            <a:off x="504203" y="5705386"/>
-            <a:ext cx="5040963" cy="646331"/>
+            <a:off x="627686" y="5808166"/>
+            <a:ext cx="5249579" cy="369332"/>
           </a:xfrm>
           <a:prstGeom prst="rect">
             <a:avLst/>
@@ -4060,17 +4141,52 @@
             <a:pPr algn="ctr"/>
             <a:r>
               <a:rPr lang="fr-FR" dirty="0"/>
-              <a:t>Cliquer ici pour obtenir le chemin d’accès jusqu’au dossier « TWAV_splitter »</a:t>
+              <a:t>Cliquer sur le bouton vert Code puis sur Download ZIP</a:t>
+            </a:r>
+          </a:p>
+        </p:txBody>
+      </p:sp>
+      <p:sp>
+        <p:nvSpPr>
+          <p:cNvPr id="14" name="ZoneTexte 13">
+            <a:extLst>
+              <a:ext uri="{FF2B5EF4-FFF2-40B4-BE49-F238E27FC236}">
+                <a16:creationId xmlns:a16="http://schemas.microsoft.com/office/drawing/2014/main" id="{D7AAA7A9-7188-710B-910F-3B79EF17B71F}"/>
+              </a:ext>
+            </a:extLst>
+          </p:cNvPr>
+          <p:cNvSpPr txBox="1"/>
+          <p:nvPr/>
+        </p:nvSpPr>
+        <p:spPr>
+          <a:xfrm>
+            <a:off x="6407183" y="1471548"/>
+            <a:ext cx="2695161" cy="369332"/>
+          </a:xfrm>
+          <a:prstGeom prst="rect">
+            <a:avLst/>
+          </a:prstGeom>
+          <a:noFill/>
+        </p:spPr>
+        <p:txBody>
+          <a:bodyPr wrap="none" rtlCol="0">
+            <a:spAutoFit/>
+          </a:bodyPr>
+          <a:lstStyle/>
+          <a:p>
+            <a:r>
+              <a:rPr lang="fr-FR" dirty="0"/>
+              <a:t>Extraire les fichiers du ZIP :</a:t>
             </a:r>
           </a:p>
         </p:txBody>
       </p:sp>
       <p:pic>
         <p:nvPicPr>
-          <p:cNvPr id="13" name="Image 12">
-            <a:extLst>
-              <a:ext uri="{FF2B5EF4-FFF2-40B4-BE49-F238E27FC236}">
-                <a16:creationId xmlns:a16="http://schemas.microsoft.com/office/drawing/2014/main" id="{40462DDB-C674-B3D5-8479-D10720937FD9}"/>
+          <p:cNvPr id="23" name="Image 22">
+            <a:extLst>
+              <a:ext uri="{FF2B5EF4-FFF2-40B4-BE49-F238E27FC236}">
+                <a16:creationId xmlns:a16="http://schemas.microsoft.com/office/drawing/2014/main" id="{1137CDD8-E265-2867-00CA-8DE2D4940E84}"/>
               </a:ext>
             </a:extLst>
           </p:cNvPr>
@@ -4080,20 +4196,20 @@
           <p:nvPr/>
         </p:nvPicPr>
         <p:blipFill>
-          <a:blip r:embed="rId4"/>
+          <a:blip r:embed="rId5"/>
           <a:stretch>
             <a:fillRect/>
           </a:stretch>
         </p:blipFill>
         <p:spPr>
           <a:xfrm>
-            <a:off x="6643261" y="3156725"/>
-            <a:ext cx="5044536" cy="2343458"/>
+            <a:off x="6495318" y="2038156"/>
+            <a:ext cx="2991581" cy="1091927"/>
           </a:xfrm>
           <a:prstGeom prst="rect">
             <a:avLst/>
           </a:prstGeom>
-          <a:ln>
+          <a:ln w="12700">
             <a:solidFill>
               <a:schemeClr val="tx1"/>
             </a:solidFill>
@@ -4102,46 +4218,62 @@
       </p:pic>
       <p:sp>
         <p:nvSpPr>
-          <p:cNvPr id="14" name="ZoneTexte 13">
-            <a:extLst>
-              <a:ext uri="{FF2B5EF4-FFF2-40B4-BE49-F238E27FC236}">
-                <a16:creationId xmlns:a16="http://schemas.microsoft.com/office/drawing/2014/main" id="{CE621427-5222-37E0-522F-824E02C71150}"/>
-              </a:ext>
-            </a:extLst>
-          </p:cNvPr>
-          <p:cNvSpPr txBox="1"/>
+          <p:cNvPr id="26" name="Rectangle 25">
+            <a:extLst>
+              <a:ext uri="{FF2B5EF4-FFF2-40B4-BE49-F238E27FC236}">
+                <a16:creationId xmlns:a16="http://schemas.microsoft.com/office/drawing/2014/main" id="{42E95AD2-0AD9-8F7E-04A2-7004E48AEAD7}"/>
+              </a:ext>
+            </a:extLst>
+          </p:cNvPr>
+          <p:cNvSpPr/>
           <p:nvPr/>
         </p:nvSpPr>
         <p:spPr>
           <a:xfrm>
-            <a:off x="6643261" y="5705385"/>
-            <a:ext cx="5040963" cy="369332"/>
+            <a:off x="7281862" y="2931320"/>
+            <a:ext cx="642935" cy="217814"/>
           </a:xfrm>
           <a:prstGeom prst="rect">
             <a:avLst/>
           </a:prstGeom>
           <a:noFill/>
-        </p:spPr>
-        <p:txBody>
-          <a:bodyPr wrap="square" rtlCol="0">
-            <a:spAutoFit/>
-          </a:bodyPr>
+          <a:ln w="38100">
+            <a:solidFill>
+              <a:srgbClr val="FF0000"/>
+            </a:solidFill>
+          </a:ln>
+        </p:spPr>
+        <p:style>
+          <a:lnRef idx="2">
+            <a:schemeClr val="accent1">
+              <a:shade val="50000"/>
+            </a:schemeClr>
+          </a:lnRef>
+          <a:fillRef idx="1">
+            <a:schemeClr val="accent1"/>
+          </a:fillRef>
+          <a:effectRef idx="0">
+            <a:schemeClr val="accent1"/>
+          </a:effectRef>
+          <a:fontRef idx="minor">
+            <a:schemeClr val="lt1"/>
+          </a:fontRef>
+        </p:style>
+        <p:txBody>
+          <a:bodyPr rtlCol="0" anchor="ctr"/>
           <a:lstStyle/>
           <a:p>
             <a:pPr algn="ctr"/>
-            <a:r>
-              <a:rPr lang="fr-FR" dirty="0"/>
-              <a:t>[Ctrl C] pour copier le chemin d’accès</a:t>
-            </a:r>
-          </a:p>
-        </p:txBody>
-      </p:sp>
-      <p:sp>
-        <p:nvSpPr>
-          <p:cNvPr id="19" name="ZoneTexte 18">
-            <a:extLst>
-              <a:ext uri="{FF2B5EF4-FFF2-40B4-BE49-F238E27FC236}">
-                <a16:creationId xmlns:a16="http://schemas.microsoft.com/office/drawing/2014/main" id="{22F30263-2387-4D8E-859D-C5EBC4C33433}"/>
+            <a:endParaRPr lang="fr-FR" dirty="0"/>
+          </a:p>
+        </p:txBody>
+      </p:sp>
+      <p:sp>
+        <p:nvSpPr>
+          <p:cNvPr id="35" name="ZoneTexte 34">
+            <a:extLst>
+              <a:ext uri="{FF2B5EF4-FFF2-40B4-BE49-F238E27FC236}">
+                <a16:creationId xmlns:a16="http://schemas.microsoft.com/office/drawing/2014/main" id="{0EE82A0D-C99B-1EE1-1068-FF5364080055}"/>
               </a:ext>
             </a:extLst>
           </p:cNvPr>
@@ -4150,8 +4282,8 @@
         </p:nvSpPr>
         <p:spPr>
           <a:xfrm>
-            <a:off x="504203" y="688885"/>
-            <a:ext cx="9005799" cy="461665"/>
+            <a:off x="9591672" y="4063237"/>
+            <a:ext cx="2517449" cy="923330"/>
           </a:xfrm>
           <a:prstGeom prst="rect">
             <a:avLst/>
@@ -4159,53 +4291,172 @@
           <a:noFill/>
         </p:spPr>
         <p:txBody>
-          <a:bodyPr wrap="none" rtlCol="0">
+          <a:bodyPr wrap="square" rtlCol="0">
             <a:spAutoFit/>
           </a:bodyPr>
           <a:lstStyle/>
           <a:p>
-            <a:r>
-              <a:rPr lang="fr-FR" sz="2400" b="1" dirty="0"/>
-              <a:t>1. Récupérer le chemin d’accès au répertoire de travail TWAV_splitter</a:t>
-            </a:r>
-          </a:p>
-        </p:txBody>
-      </p:sp>
-      <p:pic>
-        <p:nvPicPr>
-          <p:cNvPr id="3" name="Image 2">
-            <a:extLst>
-              <a:ext uri="{FF2B5EF4-FFF2-40B4-BE49-F238E27FC236}">
-                <a16:creationId xmlns:a16="http://schemas.microsoft.com/office/drawing/2014/main" id="{D5F9F927-8E7F-F605-35F1-A729B92DC1F1}"/>
-              </a:ext>
-            </a:extLst>
-          </p:cNvPr>
-          <p:cNvPicPr>
-            <a:picLocks noChangeAspect="1"/>
-          </p:cNvPicPr>
+            <a:pPr algn="just"/>
+            <a:r>
+              <a:rPr lang="fr-FR" dirty="0"/>
+              <a:t>Choisissez où extraire les fichiers et appuyer sur le bouton extraire. </a:t>
+            </a:r>
+          </a:p>
+        </p:txBody>
+      </p:sp>
+      <p:grpSp>
+        <p:nvGrpSpPr>
+          <p:cNvPr id="39" name="Groupe 38">
+            <a:extLst>
+              <a:ext uri="{FF2B5EF4-FFF2-40B4-BE49-F238E27FC236}">
+                <a16:creationId xmlns:a16="http://schemas.microsoft.com/office/drawing/2014/main" id="{DD53F370-40A0-AD84-E4B0-E249D9D3F6CF}"/>
+              </a:ext>
+            </a:extLst>
+          </p:cNvPr>
+          <p:cNvGrpSpPr/>
           <p:nvPr/>
-        </p:nvPicPr>
-        <p:blipFill rotWithShape="1">
-          <a:blip r:embed="rId5"/>
-          <a:srcRect l="14460" t="17241" r="18251" b="16671"/>
-          <a:stretch/>
-        </p:blipFill>
-        <p:spPr>
-          <a:xfrm>
-            <a:off x="504203" y="1646611"/>
-            <a:ext cx="1352551" cy="963253"/>
-          </a:xfrm>
-          <a:prstGeom prst="rect">
-            <a:avLst/>
-          </a:prstGeom>
-        </p:spPr>
-      </p:pic>
-      <p:sp>
-        <p:nvSpPr>
-          <p:cNvPr id="4" name="ZoneTexte 3">
-            <a:extLst>
-              <a:ext uri="{FF2B5EF4-FFF2-40B4-BE49-F238E27FC236}">
-                <a16:creationId xmlns:a16="http://schemas.microsoft.com/office/drawing/2014/main" id="{CAF4FCA3-4F91-29B5-FE12-7D4B46D90F1D}"/>
+        </p:nvGrpSpPr>
+        <p:grpSpPr>
+          <a:xfrm>
+            <a:off x="6495318" y="3354467"/>
+            <a:ext cx="2991581" cy="2340870"/>
+            <a:chOff x="6495318" y="3260185"/>
+            <a:chExt cx="2991581" cy="2340870"/>
+          </a:xfrm>
+        </p:grpSpPr>
+        <p:pic>
+          <p:nvPicPr>
+            <p:cNvPr id="33" name="Image 32">
+              <a:extLst>
+                <a:ext uri="{FF2B5EF4-FFF2-40B4-BE49-F238E27FC236}">
+                  <a16:creationId xmlns:a16="http://schemas.microsoft.com/office/drawing/2014/main" id="{55E0AAF8-9B33-156C-2356-A47AB673FE1B}"/>
+                </a:ext>
+              </a:extLst>
+            </p:cNvPr>
+            <p:cNvPicPr>
+              <a:picLocks noChangeAspect="1"/>
+            </p:cNvPicPr>
+            <p:nvPr/>
+          </p:nvPicPr>
+          <p:blipFill>
+            <a:blip r:embed="rId6"/>
+            <a:stretch>
+              <a:fillRect/>
+            </a:stretch>
+          </p:blipFill>
+          <p:spPr>
+            <a:xfrm>
+              <a:off x="6495318" y="3260185"/>
+              <a:ext cx="2991581" cy="2340870"/>
+            </a:xfrm>
+            <a:prstGeom prst="rect">
+              <a:avLst/>
+            </a:prstGeom>
+            <a:ln w="12700">
+              <a:solidFill>
+                <a:schemeClr val="tx1"/>
+              </a:solidFill>
+            </a:ln>
+          </p:spPr>
+        </p:pic>
+        <p:pic>
+          <p:nvPicPr>
+            <p:cNvPr id="34" name="Image 33">
+              <a:extLst>
+                <a:ext uri="{FF2B5EF4-FFF2-40B4-BE49-F238E27FC236}">
+                  <a16:creationId xmlns:a16="http://schemas.microsoft.com/office/drawing/2014/main" id="{0688ACDC-BADB-E2CC-9C9F-E4FA27431EFB}"/>
+                </a:ext>
+              </a:extLst>
+            </p:cNvPr>
+            <p:cNvPicPr>
+              <a:picLocks noChangeAspect="1"/>
+            </p:cNvPicPr>
+            <p:nvPr/>
+          </p:nvPicPr>
+          <p:blipFill>
+            <a:blip r:embed="rId4">
+              <a:extLst>
+                <a:ext uri="{28A0092B-C50C-407E-A947-70E740481C1C}">
+                  <a14:useLocalDpi xmlns:a14="http://schemas.microsoft.com/office/drawing/2010/main" val="0"/>
+                </a:ext>
+              </a:extLst>
+            </a:blip>
+            <a:stretch>
+              <a:fillRect/>
+            </a:stretch>
+          </p:blipFill>
+          <p:spPr>
+            <a:xfrm rot="5400000">
+              <a:off x="8538464" y="5356915"/>
+              <a:ext cx="228080" cy="228080"/>
+            </a:xfrm>
+            <a:prstGeom prst="rect">
+              <a:avLst/>
+            </a:prstGeom>
+            <a:ln w="12700">
+              <a:noFill/>
+            </a:ln>
+          </p:spPr>
+        </p:pic>
+        <p:sp>
+          <p:nvSpPr>
+            <p:cNvPr id="36" name="Rectangle 35">
+              <a:extLst>
+                <a:ext uri="{FF2B5EF4-FFF2-40B4-BE49-F238E27FC236}">
+                  <a16:creationId xmlns:a16="http://schemas.microsoft.com/office/drawing/2014/main" id="{43BF8ED3-9357-A567-69A3-EB3FCFF5374C}"/>
+                </a:ext>
+              </a:extLst>
+            </p:cNvPr>
+            <p:cNvSpPr/>
+            <p:nvPr/>
+          </p:nvSpPr>
+          <p:spPr>
+            <a:xfrm>
+              <a:off x="8858250" y="4190042"/>
+              <a:ext cx="426244" cy="184238"/>
+            </a:xfrm>
+            <a:prstGeom prst="rect">
+              <a:avLst/>
+            </a:prstGeom>
+            <a:noFill/>
+            <a:ln w="38100">
+              <a:solidFill>
+                <a:srgbClr val="FF0000"/>
+              </a:solidFill>
+            </a:ln>
+          </p:spPr>
+          <p:style>
+            <a:lnRef idx="2">
+              <a:schemeClr val="accent1">
+                <a:shade val="50000"/>
+              </a:schemeClr>
+            </a:lnRef>
+            <a:fillRef idx="1">
+              <a:schemeClr val="accent1"/>
+            </a:fillRef>
+            <a:effectRef idx="0">
+              <a:schemeClr val="accent1"/>
+            </a:effectRef>
+            <a:fontRef idx="minor">
+              <a:schemeClr val="lt1"/>
+            </a:fontRef>
+          </p:style>
+          <p:txBody>
+            <a:bodyPr rtlCol="0" anchor="ctr"/>
+            <a:lstStyle/>
+            <a:p>
+              <a:pPr algn="ctr"/>
+              <a:endParaRPr lang="fr-FR" dirty="0"/>
+            </a:p>
+          </p:txBody>
+        </p:sp>
+      </p:grpSp>
+      <p:sp>
+        <p:nvSpPr>
+          <p:cNvPr id="37" name="ZoneTexte 36">
+            <a:extLst>
+              <a:ext uri="{FF2B5EF4-FFF2-40B4-BE49-F238E27FC236}">
+                <a16:creationId xmlns:a16="http://schemas.microsoft.com/office/drawing/2014/main" id="{F459BE84-620B-2E7A-EDB7-C0CAFD143E56}"/>
               </a:ext>
             </a:extLst>
           </p:cNvPr>
@@ -4214,8 +4465,8 @@
         </p:nvSpPr>
         <p:spPr>
           <a:xfrm>
-            <a:off x="1938897" y="1989738"/>
-            <a:ext cx="3455818" cy="369332"/>
+            <a:off x="9591672" y="2260953"/>
+            <a:ext cx="2517449" cy="646331"/>
           </a:xfrm>
           <a:prstGeom prst="rect">
             <a:avLst/>
@@ -4223,14 +4474,15 @@
           <a:noFill/>
         </p:spPr>
         <p:txBody>
-          <a:bodyPr wrap="none" rtlCol="0">
+          <a:bodyPr wrap="square" rtlCol="0">
             <a:spAutoFit/>
           </a:bodyPr>
           <a:lstStyle/>
           <a:p>
+            <a:pPr algn="just"/>
             <a:r>
               <a:rPr lang="fr-FR" dirty="0"/>
-              <a:t>Ouvrir le dossier « TWAV_splitter »</a:t>
+              <a:t>Clic droit sur le dossier puis Extraire tout…</a:t>
             </a:r>
           </a:p>
         </p:txBody>
@@ -4238,7 +4490,7 @@
     </p:spTree>
     <p:extLst>
       <p:ext uri="{BB962C8B-B14F-4D97-AF65-F5344CB8AC3E}">
-        <p14:creationId xmlns:p14="http://schemas.microsoft.com/office/powerpoint/2010/main" val="3132208709"/>
+        <p14:creationId xmlns:p14="http://schemas.microsoft.com/office/powerpoint/2010/main" val="378487392"/>
       </p:ext>
     </p:extLst>
   </p:cSld>
@@ -4267,10 +4519,10 @@
       </p:grpSpPr>
       <p:sp>
         <p:nvSpPr>
-          <p:cNvPr id="4" name="ZoneTexte 3">
-            <a:extLst>
-              <a:ext uri="{FF2B5EF4-FFF2-40B4-BE49-F238E27FC236}">
-                <a16:creationId xmlns:a16="http://schemas.microsoft.com/office/drawing/2014/main" id="{F64181D5-3D5B-12A1-3772-AC7716CB8E58}"/>
+          <p:cNvPr id="9" name="ZoneTexte 8">
+            <a:extLst>
+              <a:ext uri="{FF2B5EF4-FFF2-40B4-BE49-F238E27FC236}">
+                <a16:creationId xmlns:a16="http://schemas.microsoft.com/office/drawing/2014/main" id="{BE7E9142-4CA7-3DD9-6675-22A589BF34F2}"/>
               </a:ext>
             </a:extLst>
           </p:cNvPr>
@@ -4279,8 +4531,8 @@
         </p:nvSpPr>
         <p:spPr>
           <a:xfrm>
-            <a:off x="504203" y="688886"/>
-            <a:ext cx="9960355" cy="461665"/>
+            <a:off x="504203" y="5705386"/>
+            <a:ext cx="5040963" cy="646331"/>
           </a:xfrm>
           <a:prstGeom prst="rect">
             <a:avLst/>
@@ -4288,6 +4540,86 @@
           <a:noFill/>
         </p:spPr>
         <p:txBody>
+          <a:bodyPr wrap="square" rtlCol="0">
+            <a:spAutoFit/>
+          </a:bodyPr>
+          <a:lstStyle/>
+          <a:p>
+            <a:pPr algn="ctr"/>
+            <a:r>
+              <a:rPr lang="fr-FR" dirty="0"/>
+              <a:t>Cliquer ici pour obtenir le chemin d’accès jusqu’au dossier « </a:t>
+            </a:r>
+            <a:r>
+              <a:rPr lang="fr-FR" dirty="0" err="1"/>
+              <a:t>TWAV_splitter_main</a:t>
+            </a:r>
+            <a:r>
+              <a:rPr lang="fr-FR" dirty="0"/>
+              <a:t> »</a:t>
+            </a:r>
+          </a:p>
+        </p:txBody>
+      </p:sp>
+      <p:sp>
+        <p:nvSpPr>
+          <p:cNvPr id="14" name="ZoneTexte 13">
+            <a:extLst>
+              <a:ext uri="{FF2B5EF4-FFF2-40B4-BE49-F238E27FC236}">
+                <a16:creationId xmlns:a16="http://schemas.microsoft.com/office/drawing/2014/main" id="{CE621427-5222-37E0-522F-824E02C71150}"/>
+              </a:ext>
+            </a:extLst>
+          </p:cNvPr>
+          <p:cNvSpPr txBox="1"/>
+          <p:nvPr/>
+        </p:nvSpPr>
+        <p:spPr>
+          <a:xfrm>
+            <a:off x="6643261" y="5705385"/>
+            <a:ext cx="5040963" cy="369332"/>
+          </a:xfrm>
+          <a:prstGeom prst="rect">
+            <a:avLst/>
+          </a:prstGeom>
+          <a:noFill/>
+        </p:spPr>
+        <p:txBody>
+          <a:bodyPr wrap="square" rtlCol="0">
+            <a:spAutoFit/>
+          </a:bodyPr>
+          <a:lstStyle/>
+          <a:p>
+            <a:pPr algn="ctr"/>
+            <a:r>
+              <a:rPr lang="fr-FR" dirty="0"/>
+              <a:t>[Ctrl C] pour copier le chemin d’accès</a:t>
+            </a:r>
+          </a:p>
+        </p:txBody>
+      </p:sp>
+      <p:sp>
+        <p:nvSpPr>
+          <p:cNvPr id="19" name="ZoneTexte 18">
+            <a:extLst>
+              <a:ext uri="{FF2B5EF4-FFF2-40B4-BE49-F238E27FC236}">
+                <a16:creationId xmlns:a16="http://schemas.microsoft.com/office/drawing/2014/main" id="{22F30263-2387-4D8E-859D-C5EBC4C33433}"/>
+              </a:ext>
+            </a:extLst>
+          </p:cNvPr>
+          <p:cNvSpPr txBox="1"/>
+          <p:nvPr/>
+        </p:nvSpPr>
+        <p:spPr>
+          <a:xfrm>
+            <a:off x="504203" y="688885"/>
+            <a:ext cx="9005799" cy="461665"/>
+          </a:xfrm>
+          <a:prstGeom prst="rect">
+            <a:avLst/>
+          </a:prstGeom>
+          <a:noFill/>
+        </p:spPr>
+        <p:txBody>
           <a:bodyPr wrap="none" rtlCol="0">
             <a:spAutoFit/>
           </a:bodyPr>
@@ -4295,7 +4627,260 @@
           <a:p>
             <a:r>
               <a:rPr lang="fr-FR" sz="2400" b="1" dirty="0"/>
-              <a:t>2. Définir le chemin d’accès au répertoire de travail sur l’invite de commande</a:t>
+              <a:t>2. Récupérer le chemin d’accès au répertoire de travail TWAV_splitter</a:t>
+            </a:r>
+          </a:p>
+        </p:txBody>
+      </p:sp>
+      <p:sp>
+        <p:nvSpPr>
+          <p:cNvPr id="4" name="ZoneTexte 3">
+            <a:extLst>
+              <a:ext uri="{FF2B5EF4-FFF2-40B4-BE49-F238E27FC236}">
+                <a16:creationId xmlns:a16="http://schemas.microsoft.com/office/drawing/2014/main" id="{CAF4FCA3-4F91-29B5-FE12-7D4B46D90F1D}"/>
+              </a:ext>
+            </a:extLst>
+          </p:cNvPr>
+          <p:cNvSpPr txBox="1"/>
+          <p:nvPr/>
+        </p:nvSpPr>
+        <p:spPr>
+          <a:xfrm>
+            <a:off x="1938897" y="1659486"/>
+            <a:ext cx="9745327" cy="923330"/>
+          </a:xfrm>
+          <a:prstGeom prst="rect">
+            <a:avLst/>
+          </a:prstGeom>
+          <a:noFill/>
+        </p:spPr>
+        <p:txBody>
+          <a:bodyPr wrap="square" rtlCol="0">
+            <a:spAutoFit/>
+          </a:bodyPr>
+          <a:lstStyle/>
+          <a:p>
+            <a:r>
+              <a:rPr lang="fr-FR" dirty="0"/>
+              <a:t>Ouvrir le dossier « TWAV_splitter-main »</a:t>
+            </a:r>
+            <a:br>
+              <a:rPr lang="fr-FR" dirty="0"/>
+            </a:br>
+            <a:r>
+              <a:rPr lang="fr-FR" dirty="0">
+                <a:solidFill>
+                  <a:schemeClr val="bg1">
+                    <a:lumMod val="65000"/>
+                  </a:schemeClr>
+                </a:solidFill>
+              </a:rPr>
+              <a:t>Il se peut que l’extraction des fichiers ait créé un autre dossier du même nom qui contient le dossier « TWAV_splitter-main » ; ouvrez le dernier des deux pour voir tous les fichiers comme ci-dessous :</a:t>
+            </a:r>
+          </a:p>
+        </p:txBody>
+      </p:sp>
+      <p:pic>
+        <p:nvPicPr>
+          <p:cNvPr id="5" name="Image 4">
+            <a:extLst>
+              <a:ext uri="{FF2B5EF4-FFF2-40B4-BE49-F238E27FC236}">
+                <a16:creationId xmlns:a16="http://schemas.microsoft.com/office/drawing/2014/main" id="{EEB9CFEB-3864-DD99-E7FD-63BA774D48E5}"/>
+              </a:ext>
+            </a:extLst>
+          </p:cNvPr>
+          <p:cNvPicPr>
+            <a:picLocks noChangeAspect="1"/>
+          </p:cNvPicPr>
+          <p:nvPr/>
+        </p:nvPicPr>
+        <p:blipFill>
+          <a:blip r:embed="rId2"/>
+          <a:stretch>
+            <a:fillRect/>
+          </a:stretch>
+        </p:blipFill>
+        <p:spPr>
+          <a:xfrm>
+            <a:off x="504203" y="1523004"/>
+            <a:ext cx="1288941" cy="1302800"/>
+          </a:xfrm>
+          <a:prstGeom prst="rect">
+            <a:avLst/>
+          </a:prstGeom>
+          <a:ln>
+            <a:solidFill>
+              <a:schemeClr val="tx1"/>
+            </a:solidFill>
+          </a:ln>
+        </p:spPr>
+      </p:pic>
+      <p:pic>
+        <p:nvPicPr>
+          <p:cNvPr id="7" name="Image 6">
+            <a:extLst>
+              <a:ext uri="{FF2B5EF4-FFF2-40B4-BE49-F238E27FC236}">
+                <a16:creationId xmlns:a16="http://schemas.microsoft.com/office/drawing/2014/main" id="{230B4DC0-CA2C-3ABB-4C60-DC85148A7908}"/>
+              </a:ext>
+            </a:extLst>
+          </p:cNvPr>
+          <p:cNvPicPr>
+            <a:picLocks noChangeAspect="1"/>
+          </p:cNvPicPr>
+          <p:nvPr/>
+        </p:nvPicPr>
+        <p:blipFill rotWithShape="1">
+          <a:blip r:embed="rId3"/>
+          <a:srcRect b="342"/>
+          <a:stretch/>
+        </p:blipFill>
+        <p:spPr>
+          <a:xfrm>
+            <a:off x="632229" y="3156725"/>
+            <a:ext cx="4784909" cy="2337203"/>
+          </a:xfrm>
+          <a:prstGeom prst="rect">
+            <a:avLst/>
+          </a:prstGeom>
+          <a:ln>
+            <a:solidFill>
+              <a:schemeClr val="tx1"/>
+            </a:solidFill>
+          </a:ln>
+        </p:spPr>
+      </p:pic>
+      <p:pic>
+        <p:nvPicPr>
+          <p:cNvPr id="10" name="Image 9">
+            <a:extLst>
+              <a:ext uri="{FF2B5EF4-FFF2-40B4-BE49-F238E27FC236}">
+                <a16:creationId xmlns:a16="http://schemas.microsoft.com/office/drawing/2014/main" id="{5FF28F05-B8D5-EC8A-2DA8-100270B09792}"/>
+              </a:ext>
+            </a:extLst>
+          </p:cNvPr>
+          <p:cNvPicPr>
+            <a:picLocks noChangeAspect="1"/>
+          </p:cNvPicPr>
+          <p:nvPr/>
+        </p:nvPicPr>
+        <p:blipFill>
+          <a:blip r:embed="rId4">
+            <a:extLst>
+              <a:ext uri="{28A0092B-C50C-407E-A947-70E740481C1C}">
+                <a14:useLocalDpi xmlns:a14="http://schemas.microsoft.com/office/drawing/2010/main" val="0"/>
+              </a:ext>
+            </a:extLst>
+          </a:blip>
+          <a:stretch>
+            <a:fillRect/>
+          </a:stretch>
+        </p:blipFill>
+        <p:spPr>
+          <a:xfrm>
+            <a:off x="1972234" y="3505039"/>
+            <a:ext cx="280141" cy="280141"/>
+          </a:xfrm>
+          <a:prstGeom prst="rect">
+            <a:avLst/>
+          </a:prstGeom>
+        </p:spPr>
+      </p:pic>
+      <p:pic>
+        <p:nvPicPr>
+          <p:cNvPr id="15" name="Image 14">
+            <a:extLst>
+              <a:ext uri="{FF2B5EF4-FFF2-40B4-BE49-F238E27FC236}">
+                <a16:creationId xmlns:a16="http://schemas.microsoft.com/office/drawing/2014/main" id="{645764B6-E4B1-05B6-9A4D-AA84FCD4B751}"/>
+              </a:ext>
+            </a:extLst>
+          </p:cNvPr>
+          <p:cNvPicPr>
+            <a:picLocks noChangeAspect="1"/>
+          </p:cNvPicPr>
+          <p:nvPr/>
+        </p:nvPicPr>
+        <p:blipFill>
+          <a:blip r:embed="rId5"/>
+          <a:stretch>
+            <a:fillRect/>
+          </a:stretch>
+        </p:blipFill>
+        <p:spPr>
+          <a:xfrm>
+            <a:off x="6774864" y="3156623"/>
+            <a:ext cx="4784910" cy="2337305"/>
+          </a:xfrm>
+          <a:prstGeom prst="rect">
+            <a:avLst/>
+          </a:prstGeom>
+          <a:ln>
+            <a:solidFill>
+              <a:schemeClr val="tx1"/>
+            </a:solidFill>
+          </a:ln>
+        </p:spPr>
+      </p:pic>
+    </p:spTree>
+    <p:extLst>
+      <p:ext uri="{BB962C8B-B14F-4D97-AF65-F5344CB8AC3E}">
+        <p14:creationId xmlns:p14="http://schemas.microsoft.com/office/powerpoint/2010/main" val="3132208709"/>
+      </p:ext>
+    </p:extLst>
+  </p:cSld>
+  <p:clrMapOvr>
+    <a:masterClrMapping/>
+  </p:clrMapOvr>
+</p:sld>
+</file>
+
+<file path=ppt/slides/slide5.xml><?xml version="1.0" encoding="utf-8"?>
+<p:sld xmlns:a="http://schemas.openxmlformats.org/drawingml/2006/main" xmlns:r="http://schemas.openxmlformats.org/officeDocument/2006/relationships" xmlns:p="http://schemas.openxmlformats.org/presentationml/2006/main">
+  <p:cSld>
+    <p:spTree>
+      <p:nvGrpSpPr>
+        <p:cNvPr id="1" name=""/>
+        <p:cNvGrpSpPr/>
+        <p:nvPr/>
+      </p:nvGrpSpPr>
+      <p:grpSpPr>
+        <a:xfrm>
+          <a:off x="0" y="0"/>
+          <a:ext cx="0" cy="0"/>
+          <a:chOff x="0" y="0"/>
+          <a:chExt cx="0" cy="0"/>
+        </a:xfrm>
+      </p:grpSpPr>
+      <p:sp>
+        <p:nvSpPr>
+          <p:cNvPr id="4" name="ZoneTexte 3">
+            <a:extLst>
+              <a:ext uri="{FF2B5EF4-FFF2-40B4-BE49-F238E27FC236}">
+                <a16:creationId xmlns:a16="http://schemas.microsoft.com/office/drawing/2014/main" id="{F64181D5-3D5B-12A1-3772-AC7716CB8E58}"/>
+              </a:ext>
+            </a:extLst>
+          </p:cNvPr>
+          <p:cNvSpPr txBox="1"/>
+          <p:nvPr/>
+        </p:nvSpPr>
+        <p:spPr>
+          <a:xfrm>
+            <a:off x="504203" y="688886"/>
+            <a:ext cx="9960355" cy="461665"/>
+          </a:xfrm>
+          <a:prstGeom prst="rect">
+            <a:avLst/>
+          </a:prstGeom>
+          <a:noFill/>
+        </p:spPr>
+        <p:txBody>
+          <a:bodyPr wrap="none" rtlCol="0">
+            <a:spAutoFit/>
+          </a:bodyPr>
+          <a:lstStyle/>
+          <a:p>
+            <a:r>
+              <a:rPr lang="fr-FR" sz="2400" b="1" dirty="0"/>
+              <a:t>3. Définir le chemin d’accès au répertoire de travail sur l’invite de commande</a:t>
             </a:r>
           </a:p>
         </p:txBody>
@@ -4496,12 +5081,84 @@
           </a:p>
         </p:txBody>
       </p:sp>
+      <p:sp>
+        <p:nvSpPr>
+          <p:cNvPr id="17" name="ZoneTexte 16">
+            <a:extLst>
+              <a:ext uri="{FF2B5EF4-FFF2-40B4-BE49-F238E27FC236}">
+                <a16:creationId xmlns:a16="http://schemas.microsoft.com/office/drawing/2014/main" id="{F6534F37-B3BB-767D-3065-5AD69CCBDB43}"/>
+              </a:ext>
+            </a:extLst>
+          </p:cNvPr>
+          <p:cNvSpPr txBox="1"/>
+          <p:nvPr/>
+        </p:nvSpPr>
+        <p:spPr>
+          <a:xfrm>
+            <a:off x="5939538" y="3105834"/>
+            <a:ext cx="5793621" cy="646331"/>
+          </a:xfrm>
+          <a:prstGeom prst="rect">
+            <a:avLst/>
+          </a:prstGeom>
+          <a:noFill/>
+        </p:spPr>
+        <p:txBody>
+          <a:bodyPr wrap="square" rtlCol="0">
+            <a:spAutoFit/>
+          </a:bodyPr>
+          <a:lstStyle/>
+          <a:p>
+            <a:pPr algn="ctr"/>
+            <a:r>
+              <a:rPr lang="fr-FR" dirty="0"/>
+              <a:t>Écrire cd suivi d’un espace et du chemin d’accès [Ctrl V] puis appuyer sur la touche [Entrée] </a:t>
+            </a:r>
+          </a:p>
+        </p:txBody>
+      </p:sp>
+      <p:sp>
+        <p:nvSpPr>
+          <p:cNvPr id="22" name="ZoneTexte 21">
+            <a:extLst>
+              <a:ext uri="{FF2B5EF4-FFF2-40B4-BE49-F238E27FC236}">
+                <a16:creationId xmlns:a16="http://schemas.microsoft.com/office/drawing/2014/main" id="{7D9FA73F-76F5-CE34-1BAE-7D1D2578C840}"/>
+              </a:ext>
+            </a:extLst>
+          </p:cNvPr>
+          <p:cNvSpPr txBox="1"/>
+          <p:nvPr/>
+        </p:nvSpPr>
+        <p:spPr>
+          <a:xfrm>
+            <a:off x="5939538" y="5476616"/>
+            <a:ext cx="5793621" cy="646331"/>
+          </a:xfrm>
+          <a:prstGeom prst="rect">
+            <a:avLst/>
+          </a:prstGeom>
+          <a:noFill/>
+        </p:spPr>
+        <p:txBody>
+          <a:bodyPr wrap="square" rtlCol="0">
+            <a:spAutoFit/>
+          </a:bodyPr>
+          <a:lstStyle/>
+          <a:p>
+            <a:pPr algn="ctr"/>
+            <a:r>
+              <a:rPr lang="fr-FR" dirty="0"/>
+              <a:t>« \TWAV_splitter-main&gt; » doit maintenant apparaître à la fin du chemin d’accès</a:t>
+            </a:r>
+          </a:p>
+        </p:txBody>
+      </p:sp>
       <p:pic>
         <p:nvPicPr>
-          <p:cNvPr id="15" name="Image 14">
-            <a:extLst>
-              <a:ext uri="{FF2B5EF4-FFF2-40B4-BE49-F238E27FC236}">
-                <a16:creationId xmlns:a16="http://schemas.microsoft.com/office/drawing/2014/main" id="{2992C09E-0153-2E7A-F4ED-98B6471003DC}"/>
+          <p:cNvPr id="7" name="Image 6">
+            <a:extLst>
+              <a:ext uri="{FF2B5EF4-FFF2-40B4-BE49-F238E27FC236}">
+                <a16:creationId xmlns:a16="http://schemas.microsoft.com/office/drawing/2014/main" id="{082C4A13-5AEB-80B8-415B-8632BC23CEAC}"/>
               </a:ext>
             </a:extLst>
           </p:cNvPr>
@@ -4510,15 +5167,16 @@
           </p:cNvPicPr>
           <p:nvPr/>
         </p:nvPicPr>
-        <p:blipFill rotWithShape="1">
+        <p:blipFill>
           <a:blip r:embed="rId3"/>
-          <a:srcRect b="34051"/>
-          <a:stretch/>
+          <a:stretch>
+            <a:fillRect/>
+          </a:stretch>
         </p:blipFill>
         <p:spPr>
           <a:xfrm>
-            <a:off x="5939538" y="2009912"/>
-            <a:ext cx="5793622" cy="1214823"/>
+            <a:off x="5939538" y="1738175"/>
+            <a:ext cx="5793622" cy="1290397"/>
           </a:xfrm>
           <a:prstGeom prst="rect">
             <a:avLst/>
@@ -4532,189 +5190,10 @@
       </p:pic>
       <p:sp>
         <p:nvSpPr>
-          <p:cNvPr id="17" name="ZoneTexte 16">
-            <a:extLst>
-              <a:ext uri="{FF2B5EF4-FFF2-40B4-BE49-F238E27FC236}">
-                <a16:creationId xmlns:a16="http://schemas.microsoft.com/office/drawing/2014/main" id="{F6534F37-B3BB-767D-3065-5AD69CCBDB43}"/>
-              </a:ext>
-            </a:extLst>
-          </p:cNvPr>
-          <p:cNvSpPr txBox="1"/>
-          <p:nvPr/>
-        </p:nvSpPr>
-        <p:spPr>
-          <a:xfrm>
-            <a:off x="5939538" y="3224735"/>
-            <a:ext cx="5793621" cy="646331"/>
-          </a:xfrm>
-          <a:prstGeom prst="rect">
-            <a:avLst/>
-          </a:prstGeom>
-          <a:noFill/>
-        </p:spPr>
-        <p:txBody>
-          <a:bodyPr wrap="square" rtlCol="0">
-            <a:spAutoFit/>
-          </a:bodyPr>
-          <a:lstStyle/>
-          <a:p>
-            <a:pPr algn="ctr"/>
-            <a:r>
-              <a:rPr lang="fr-FR" dirty="0"/>
-              <a:t>Écrire cd suivi d’un espace et du chemin d’accès [Ctrl V] puis appuyer sur la touche [Entrée] </a:t>
-            </a:r>
-          </a:p>
-        </p:txBody>
-      </p:sp>
-      <p:grpSp>
-        <p:nvGrpSpPr>
-          <p:cNvPr id="21" name="Groupe 20">
-            <a:extLst>
-              <a:ext uri="{FF2B5EF4-FFF2-40B4-BE49-F238E27FC236}">
-                <a16:creationId xmlns:a16="http://schemas.microsoft.com/office/drawing/2014/main" id="{28C88A3A-E226-46DD-6FC5-0E5B02CB164A}"/>
-              </a:ext>
-            </a:extLst>
-          </p:cNvPr>
-          <p:cNvGrpSpPr/>
-          <p:nvPr/>
-        </p:nvGrpSpPr>
-        <p:grpSpPr>
-          <a:xfrm>
-            <a:off x="5939540" y="4292324"/>
-            <a:ext cx="5793621" cy="1179960"/>
-            <a:chOff x="5939540" y="3641018"/>
-            <a:chExt cx="5793621" cy="1179960"/>
-          </a:xfrm>
-        </p:grpSpPr>
-        <p:pic>
-          <p:nvPicPr>
-            <p:cNvPr id="19" name="Image 18">
-              <a:extLst>
-                <a:ext uri="{FF2B5EF4-FFF2-40B4-BE49-F238E27FC236}">
-                  <a16:creationId xmlns:a16="http://schemas.microsoft.com/office/drawing/2014/main" id="{D9A821C0-6669-8A6F-8E8D-4E6B3ACFEE7D}"/>
-                </a:ext>
-              </a:extLst>
-            </p:cNvPr>
-            <p:cNvPicPr>
-              <a:picLocks noChangeAspect="1"/>
-            </p:cNvPicPr>
-            <p:nvPr/>
-          </p:nvPicPr>
-          <p:blipFill rotWithShape="1">
-            <a:blip r:embed="rId4"/>
-            <a:srcRect t="478" b="35960"/>
-            <a:stretch/>
-          </p:blipFill>
-          <p:spPr>
-            <a:xfrm>
-              <a:off x="5939540" y="3641018"/>
-              <a:ext cx="5793621" cy="1179960"/>
-            </a:xfrm>
-            <a:prstGeom prst="rect">
-              <a:avLst/>
-            </a:prstGeom>
-            <a:ln>
-              <a:solidFill>
-                <a:schemeClr val="tx1"/>
-              </a:solidFill>
-            </a:ln>
-          </p:spPr>
-        </p:pic>
-        <p:sp>
-          <p:nvSpPr>
-            <p:cNvPr id="20" name="Rectangle 19">
-              <a:extLst>
-                <a:ext uri="{FF2B5EF4-FFF2-40B4-BE49-F238E27FC236}">
-                  <a16:creationId xmlns:a16="http://schemas.microsoft.com/office/drawing/2014/main" id="{A21635A2-C91B-E6DA-D1DC-12606C2D1982}"/>
-                </a:ext>
-              </a:extLst>
-            </p:cNvPr>
-            <p:cNvSpPr/>
-            <p:nvPr/>
-          </p:nvSpPr>
-          <p:spPr>
-            <a:xfrm>
-              <a:off x="7300913" y="4306843"/>
-              <a:ext cx="752474" cy="201826"/>
-            </a:xfrm>
-            <a:prstGeom prst="rect">
-              <a:avLst/>
-            </a:prstGeom>
-            <a:noFill/>
-            <a:ln w="38100">
-              <a:solidFill>
-                <a:srgbClr val="FF0000"/>
-              </a:solidFill>
-            </a:ln>
-          </p:spPr>
-          <p:style>
-            <a:lnRef idx="2">
-              <a:schemeClr val="accent1">
-                <a:shade val="50000"/>
-              </a:schemeClr>
-            </a:lnRef>
-            <a:fillRef idx="1">
-              <a:schemeClr val="accent1"/>
-            </a:fillRef>
-            <a:effectRef idx="0">
-              <a:schemeClr val="accent1"/>
-            </a:effectRef>
-            <a:fontRef idx="minor">
-              <a:schemeClr val="lt1"/>
-            </a:fontRef>
-          </p:style>
-          <p:txBody>
-            <a:bodyPr rtlCol="0" anchor="ctr"/>
-            <a:lstStyle/>
-            <a:p>
-              <a:pPr algn="ctr"/>
-              <a:endParaRPr lang="fr-FR" dirty="0"/>
-            </a:p>
-          </p:txBody>
-        </p:sp>
-      </p:grpSp>
-      <p:sp>
-        <p:nvSpPr>
-          <p:cNvPr id="22" name="ZoneTexte 21">
-            <a:extLst>
-              <a:ext uri="{FF2B5EF4-FFF2-40B4-BE49-F238E27FC236}">
-                <a16:creationId xmlns:a16="http://schemas.microsoft.com/office/drawing/2014/main" id="{7D9FA73F-76F5-CE34-1BAE-7D1D2578C840}"/>
-              </a:ext>
-            </a:extLst>
-          </p:cNvPr>
-          <p:cNvSpPr txBox="1"/>
-          <p:nvPr/>
-        </p:nvSpPr>
-        <p:spPr>
-          <a:xfrm>
-            <a:off x="5939538" y="5476616"/>
-            <a:ext cx="5793621" cy="646331"/>
-          </a:xfrm>
-          <a:prstGeom prst="rect">
-            <a:avLst/>
-          </a:prstGeom>
-          <a:noFill/>
-        </p:spPr>
-        <p:txBody>
-          <a:bodyPr wrap="square" rtlCol="0">
-            <a:spAutoFit/>
-          </a:bodyPr>
-          <a:lstStyle/>
-          <a:p>
-            <a:pPr algn="ctr"/>
-            <a:r>
-              <a:rPr lang="fr-FR" dirty="0"/>
-              <a:t>« \TWAV_splitter&gt; » doit maintenant apparaître à la fin du chemin d’accès</a:t>
-            </a:r>
-          </a:p>
-        </p:txBody>
-      </p:sp>
-      <p:sp>
-        <p:nvSpPr>
-          <p:cNvPr id="2" name="Rectangle 1">
-            <a:extLst>
-              <a:ext uri="{FF2B5EF4-FFF2-40B4-BE49-F238E27FC236}">
-                <a16:creationId xmlns:a16="http://schemas.microsoft.com/office/drawing/2014/main" id="{359ADB9D-9604-2C80-C1C1-23C6297EDF89}"/>
+          <p:cNvPr id="8" name="Rectangle 7">
+            <a:extLst>
+              <a:ext uri="{FF2B5EF4-FFF2-40B4-BE49-F238E27FC236}">
+                <a16:creationId xmlns:a16="http://schemas.microsoft.com/office/drawing/2014/main" id="{F8D5BC9B-E7D7-B71B-D66D-864E3EA78EE0}"/>
               </a:ext>
             </a:extLst>
           </p:cNvPr>
@@ -4723,8 +5202,8 @@
         </p:nvSpPr>
         <p:spPr>
           <a:xfrm>
-            <a:off x="6908800" y="2468949"/>
-            <a:ext cx="2280444" cy="201826"/>
+            <a:off x="7434263" y="2391033"/>
+            <a:ext cx="3698557" cy="201826"/>
           </a:xfrm>
           <a:prstGeom prst="rect">
             <a:avLst/>
@@ -4761,453 +5240,96 @@
           </a:p>
         </p:txBody>
       </p:sp>
+      <p:pic>
+        <p:nvPicPr>
+          <p:cNvPr id="18" name="Image 17">
+            <a:extLst>
+              <a:ext uri="{FF2B5EF4-FFF2-40B4-BE49-F238E27FC236}">
+                <a16:creationId xmlns:a16="http://schemas.microsoft.com/office/drawing/2014/main" id="{D90C29F4-9898-A270-56D5-F143E2C53BDA}"/>
+              </a:ext>
+            </a:extLst>
+          </p:cNvPr>
+          <p:cNvPicPr>
+            <a:picLocks noChangeAspect="1"/>
+          </p:cNvPicPr>
+          <p:nvPr/>
+        </p:nvPicPr>
+        <p:blipFill rotWithShape="1">
+          <a:blip r:embed="rId4"/>
+          <a:srcRect b="29711"/>
+          <a:stretch/>
+        </p:blipFill>
+        <p:spPr>
+          <a:xfrm>
+            <a:off x="5939845" y="4174656"/>
+            <a:ext cx="5793314" cy="1297628"/>
+          </a:xfrm>
+          <a:prstGeom prst="rect">
+            <a:avLst/>
+          </a:prstGeom>
+          <a:ln>
+            <a:solidFill>
+              <a:schemeClr val="tx1"/>
+            </a:solidFill>
+          </a:ln>
+        </p:spPr>
+      </p:pic>
+      <p:sp>
+        <p:nvSpPr>
+          <p:cNvPr id="23" name="Rectangle 22">
+            <a:extLst>
+              <a:ext uri="{FF2B5EF4-FFF2-40B4-BE49-F238E27FC236}">
+                <a16:creationId xmlns:a16="http://schemas.microsoft.com/office/drawing/2014/main" id="{D4F0ED20-EFAD-2D6E-F818-05AFF1F0A950}"/>
+              </a:ext>
+            </a:extLst>
+          </p:cNvPr>
+          <p:cNvSpPr/>
+          <p:nvPr/>
+        </p:nvSpPr>
+        <p:spPr>
+          <a:xfrm>
+            <a:off x="7961313" y="5123120"/>
+            <a:ext cx="1468437" cy="201826"/>
+          </a:xfrm>
+          <a:prstGeom prst="rect">
+            <a:avLst/>
+          </a:prstGeom>
+          <a:noFill/>
+          <a:ln w="38100">
+            <a:solidFill>
+              <a:srgbClr val="FF0000"/>
+            </a:solidFill>
+          </a:ln>
+        </p:spPr>
+        <p:style>
+          <a:lnRef idx="2">
+            <a:schemeClr val="accent1">
+              <a:shade val="50000"/>
+            </a:schemeClr>
+          </a:lnRef>
+          <a:fillRef idx="1">
+            <a:schemeClr val="accent1"/>
+          </a:fillRef>
+          <a:effectRef idx="0">
+            <a:schemeClr val="accent1"/>
+          </a:effectRef>
+          <a:fontRef idx="minor">
+            <a:schemeClr val="lt1"/>
+          </a:fontRef>
+        </p:style>
+        <p:txBody>
+          <a:bodyPr rtlCol="0" anchor="ctr"/>
+          <a:lstStyle/>
+          <a:p>
+            <a:pPr algn="ctr"/>
+            <a:endParaRPr lang="fr-FR" dirty="0"/>
+          </a:p>
+        </p:txBody>
+      </p:sp>
     </p:spTree>
     <p:extLst>
       <p:ext uri="{BB962C8B-B14F-4D97-AF65-F5344CB8AC3E}">
         <p14:creationId xmlns:p14="http://schemas.microsoft.com/office/powerpoint/2010/main" val="2656967942"/>
-      </p:ext>
-    </p:extLst>
-  </p:cSld>
-  <p:clrMapOvr>
-    <a:masterClrMapping/>
-  </p:clrMapOvr>
-</p:sld>
-</file>
-
-<file path=ppt/slides/slide5.xml><?xml version="1.0" encoding="utf-8"?>
-<p:sld xmlns:a="http://schemas.openxmlformats.org/drawingml/2006/main" xmlns:r="http://schemas.openxmlformats.org/officeDocument/2006/relationships" xmlns:p="http://schemas.openxmlformats.org/presentationml/2006/main">
-  <p:cSld>
-    <p:spTree>
-      <p:nvGrpSpPr>
-        <p:cNvPr id="1" name=""/>
-        <p:cNvGrpSpPr/>
-        <p:nvPr/>
-      </p:nvGrpSpPr>
-      <p:grpSpPr>
-        <a:xfrm>
-          <a:off x="0" y="0"/>
-          <a:ext cx="0" cy="0"/>
-          <a:chOff x="0" y="0"/>
-          <a:chExt cx="0" cy="0"/>
-        </a:xfrm>
-      </p:grpSpPr>
-      <p:sp>
-        <p:nvSpPr>
-          <p:cNvPr id="5" name="ZoneTexte 4">
-            <a:extLst>
-              <a:ext uri="{FF2B5EF4-FFF2-40B4-BE49-F238E27FC236}">
-                <a16:creationId xmlns:a16="http://schemas.microsoft.com/office/drawing/2014/main" id="{626AA162-95AD-CBC2-B5F0-1D3AB49269BB}"/>
-              </a:ext>
-            </a:extLst>
-          </p:cNvPr>
-          <p:cNvSpPr txBox="1"/>
-          <p:nvPr/>
-        </p:nvSpPr>
-        <p:spPr>
-          <a:xfrm>
-            <a:off x="504203" y="688885"/>
-            <a:ext cx="4579202" cy="461665"/>
-          </a:xfrm>
-          <a:prstGeom prst="rect">
-            <a:avLst/>
-          </a:prstGeom>
-          <a:noFill/>
-        </p:spPr>
-        <p:txBody>
-          <a:bodyPr wrap="none" rtlCol="0">
-            <a:spAutoFit/>
-          </a:bodyPr>
-          <a:lstStyle/>
-          <a:p>
-            <a:r>
-              <a:rPr lang="fr-FR" sz="2400" b="1" dirty="0"/>
-              <a:t>3. Exécuter le programme vigie.py </a:t>
-            </a:r>
-          </a:p>
-        </p:txBody>
-      </p:sp>
-      <p:sp>
-        <p:nvSpPr>
-          <p:cNvPr id="8" name="ZoneTexte 7">
-            <a:extLst>
-              <a:ext uri="{FF2B5EF4-FFF2-40B4-BE49-F238E27FC236}">
-                <a16:creationId xmlns:a16="http://schemas.microsoft.com/office/drawing/2014/main" id="{608F3690-D37A-7A77-C561-9551F30E17A3}"/>
-              </a:ext>
-            </a:extLst>
-          </p:cNvPr>
-          <p:cNvSpPr txBox="1"/>
-          <p:nvPr/>
-        </p:nvSpPr>
-        <p:spPr>
-          <a:xfrm>
-            <a:off x="-1" y="5063638"/>
-            <a:ext cx="12191999" cy="1354217"/>
-          </a:xfrm>
-          <a:prstGeom prst="rect">
-            <a:avLst/>
-          </a:prstGeom>
-          <a:noFill/>
-        </p:spPr>
-        <p:txBody>
-          <a:bodyPr wrap="square" rtlCol="0">
-            <a:spAutoFit/>
-          </a:bodyPr>
-          <a:lstStyle/>
-          <a:p>
-            <a:pPr algn="ctr"/>
-            <a:r>
-              <a:rPr lang="fr-FR" dirty="0"/>
-              <a:t>Écrire en respectant les espaces :</a:t>
-            </a:r>
-            <a:br>
-              <a:rPr lang="fr-FR" dirty="0"/>
-            </a:br>
-            <a:r>
-              <a:rPr lang="fr-FR" dirty="0"/>
-              <a:t>vigie.py -i </a:t>
-            </a:r>
-            <a:r>
-              <a:rPr lang="fr-FR" b="1" dirty="0"/>
-              <a:t>coller le chemin d’accès au </a:t>
-            </a:r>
-            <a:r>
-              <a:rPr lang="fr-FR" b="1" dirty="0">
-                <a:solidFill>
-                  <a:srgbClr val="3E8E5B"/>
-                </a:solidFill>
-              </a:rPr>
-              <a:t>dossier source</a:t>
-            </a:r>
-            <a:r>
-              <a:rPr lang="fr-FR" dirty="0">
-                <a:solidFill>
-                  <a:srgbClr val="3E8E5B"/>
-                </a:solidFill>
-              </a:rPr>
-              <a:t> </a:t>
-            </a:r>
-            <a:r>
-              <a:rPr lang="fr-FR" dirty="0"/>
-              <a:t>-o </a:t>
-            </a:r>
-            <a:r>
-              <a:rPr lang="fr-FR" b="1" dirty="0"/>
-              <a:t>coller le chemin d’accès au </a:t>
-            </a:r>
-            <a:r>
-              <a:rPr lang="fr-FR" b="1" dirty="0">
-                <a:solidFill>
-                  <a:srgbClr val="3E8E5B"/>
-                </a:solidFill>
-              </a:rPr>
-              <a:t>dossier de sortie</a:t>
-            </a:r>
-            <a:endParaRPr lang="fr-FR" dirty="0"/>
-          </a:p>
-          <a:p>
-            <a:pPr algn="ctr"/>
-            <a:r>
-              <a:rPr lang="fr-FR" sz="1200" dirty="0"/>
-              <a:t>(Pour récupérer les chemins d’accès aux dossiers T.Wav et .Wav, suivre la méthode vu à l’étape 1 : Ouvrir le dossier » cliquer » Copier [Ctrl C] » Coller [Ctrl V])</a:t>
-            </a:r>
-          </a:p>
-          <a:p>
-            <a:pPr algn="ctr"/>
-            <a:endParaRPr lang="fr-FR" sz="1400" dirty="0"/>
-          </a:p>
-          <a:p>
-            <a:pPr algn="ctr"/>
-            <a:r>
-              <a:rPr lang="fr-FR" dirty="0"/>
-              <a:t>Continuer avec l’étape 4 ou exécuter le programme en appuyant sur la touche [Entrée]</a:t>
-            </a:r>
-            <a:endParaRPr lang="fr-FR" b="1" dirty="0"/>
-          </a:p>
-        </p:txBody>
-      </p:sp>
-      <p:grpSp>
-        <p:nvGrpSpPr>
-          <p:cNvPr id="34" name="Groupe 33">
-            <a:extLst>
-              <a:ext uri="{FF2B5EF4-FFF2-40B4-BE49-F238E27FC236}">
-                <a16:creationId xmlns:a16="http://schemas.microsoft.com/office/drawing/2014/main" id="{CE8F14A8-2D5F-296D-2B82-14A761B7C7E6}"/>
-              </a:ext>
-            </a:extLst>
-          </p:cNvPr>
-          <p:cNvGrpSpPr/>
-          <p:nvPr/>
-        </p:nvGrpSpPr>
-        <p:grpSpPr>
-          <a:xfrm>
-            <a:off x="885099" y="1427148"/>
-            <a:ext cx="10402750" cy="3230311"/>
-            <a:chOff x="885099" y="1427148"/>
-            <a:chExt cx="10402750" cy="3230311"/>
-          </a:xfrm>
-        </p:grpSpPr>
-        <p:pic>
-          <p:nvPicPr>
-            <p:cNvPr id="22" name="Image 21">
-              <a:extLst>
-                <a:ext uri="{FF2B5EF4-FFF2-40B4-BE49-F238E27FC236}">
-                  <a16:creationId xmlns:a16="http://schemas.microsoft.com/office/drawing/2014/main" id="{F2C28478-71E1-D106-EBFE-449F3DE0D916}"/>
-                </a:ext>
-              </a:extLst>
-            </p:cNvPr>
-            <p:cNvPicPr>
-              <a:picLocks noChangeAspect="1"/>
-            </p:cNvPicPr>
-            <p:nvPr/>
-          </p:nvPicPr>
-          <p:blipFill rotWithShape="1">
-            <a:blip r:embed="rId2"/>
-            <a:srcRect t="81024" b="162"/>
-            <a:stretch/>
-          </p:blipFill>
-          <p:spPr>
-            <a:xfrm>
-              <a:off x="904150" y="3550361"/>
-              <a:ext cx="10383699" cy="1107098"/>
-            </a:xfrm>
-            <a:prstGeom prst="rect">
-              <a:avLst/>
-            </a:prstGeom>
-            <a:ln>
-              <a:solidFill>
-                <a:schemeClr val="tx1"/>
-              </a:solidFill>
-            </a:ln>
-          </p:spPr>
-        </p:pic>
-        <p:pic>
-          <p:nvPicPr>
-            <p:cNvPr id="23" name="Image 22">
-              <a:extLst>
-                <a:ext uri="{FF2B5EF4-FFF2-40B4-BE49-F238E27FC236}">
-                  <a16:creationId xmlns:a16="http://schemas.microsoft.com/office/drawing/2014/main" id="{F98177F0-9782-8EC3-5E86-DFB16464011F}"/>
-                </a:ext>
-              </a:extLst>
-            </p:cNvPr>
-            <p:cNvPicPr>
-              <a:picLocks noChangeAspect="1"/>
-            </p:cNvPicPr>
-            <p:nvPr/>
-          </p:nvPicPr>
-          <p:blipFill rotWithShape="1">
-            <a:blip r:embed="rId2"/>
-            <a:srcRect t="439" b="65541"/>
-            <a:stretch/>
-          </p:blipFill>
-          <p:spPr>
-            <a:xfrm>
-              <a:off x="904148" y="1427148"/>
-              <a:ext cx="10383699" cy="2001852"/>
-            </a:xfrm>
-            <a:prstGeom prst="rect">
-              <a:avLst/>
-            </a:prstGeom>
-            <a:ln>
-              <a:solidFill>
-                <a:schemeClr val="tx1"/>
-              </a:solidFill>
-            </a:ln>
-          </p:spPr>
-        </p:pic>
-        <p:sp>
-          <p:nvSpPr>
-            <p:cNvPr id="26" name="Rectangle 25">
-              <a:extLst>
-                <a:ext uri="{FF2B5EF4-FFF2-40B4-BE49-F238E27FC236}">
-                  <a16:creationId xmlns:a16="http://schemas.microsoft.com/office/drawing/2014/main" id="{5FFAEF32-8F37-1149-C8F4-663A7F9B6F36}"/>
-                </a:ext>
-              </a:extLst>
-            </p:cNvPr>
-            <p:cNvSpPr/>
-            <p:nvPr/>
-          </p:nvSpPr>
-          <p:spPr>
-            <a:xfrm>
-              <a:off x="3920217" y="2352967"/>
-              <a:ext cx="6785883" cy="201826"/>
-            </a:xfrm>
-            <a:prstGeom prst="rect">
-              <a:avLst/>
-            </a:prstGeom>
-            <a:noFill/>
-            <a:ln w="38100">
-              <a:solidFill>
-                <a:srgbClr val="FF0000"/>
-              </a:solidFill>
-            </a:ln>
-          </p:spPr>
-          <p:style>
-            <a:lnRef idx="2">
-              <a:schemeClr val="accent1">
-                <a:shade val="50000"/>
-              </a:schemeClr>
-            </a:lnRef>
-            <a:fillRef idx="1">
-              <a:schemeClr val="accent1"/>
-            </a:fillRef>
-            <a:effectRef idx="0">
-              <a:schemeClr val="accent1"/>
-            </a:effectRef>
-            <a:fontRef idx="minor">
-              <a:schemeClr val="lt1"/>
-            </a:fontRef>
-          </p:style>
-          <p:txBody>
-            <a:bodyPr rtlCol="0" anchor="ctr"/>
-            <a:lstStyle/>
-            <a:p>
-              <a:pPr algn="ctr"/>
-              <a:endParaRPr lang="fr-FR" dirty="0"/>
-            </a:p>
-          </p:txBody>
-        </p:sp>
-        <p:sp>
-          <p:nvSpPr>
-            <p:cNvPr id="28" name="Rectangle 27">
-              <a:extLst>
-                <a:ext uri="{FF2B5EF4-FFF2-40B4-BE49-F238E27FC236}">
-                  <a16:creationId xmlns:a16="http://schemas.microsoft.com/office/drawing/2014/main" id="{AF8D95A1-6CBF-50B8-08E1-320682792AD2}"/>
-                </a:ext>
-              </a:extLst>
-            </p:cNvPr>
-            <p:cNvSpPr/>
-            <p:nvPr/>
-          </p:nvSpPr>
-          <p:spPr>
-            <a:xfrm>
-              <a:off x="885099" y="4108659"/>
-              <a:ext cx="1061812" cy="201826"/>
-            </a:xfrm>
-            <a:prstGeom prst="rect">
-              <a:avLst/>
-            </a:prstGeom>
-            <a:noFill/>
-            <a:ln w="38100">
-              <a:solidFill>
-                <a:schemeClr val="accent2">
-                  <a:lumMod val="75000"/>
-                </a:schemeClr>
-              </a:solidFill>
-            </a:ln>
-          </p:spPr>
-          <p:style>
-            <a:lnRef idx="2">
-              <a:schemeClr val="accent1">
-                <a:shade val="50000"/>
-              </a:schemeClr>
-            </a:lnRef>
-            <a:fillRef idx="1">
-              <a:schemeClr val="accent1"/>
-            </a:fillRef>
-            <a:effectRef idx="0">
-              <a:schemeClr val="accent1"/>
-            </a:effectRef>
-            <a:fontRef idx="minor">
-              <a:schemeClr val="lt1"/>
-            </a:fontRef>
-          </p:style>
-          <p:txBody>
-            <a:bodyPr rtlCol="0" anchor="ctr"/>
-            <a:lstStyle/>
-            <a:p>
-              <a:pPr algn="ctr"/>
-              <a:endParaRPr lang="fr-FR" dirty="0"/>
-            </a:p>
-          </p:txBody>
-        </p:sp>
-        <p:sp>
-          <p:nvSpPr>
-            <p:cNvPr id="27" name="ZoneTexte 26">
-              <a:extLst>
-                <a:ext uri="{FF2B5EF4-FFF2-40B4-BE49-F238E27FC236}">
-                  <a16:creationId xmlns:a16="http://schemas.microsoft.com/office/drawing/2014/main" id="{2FFA05D0-3B70-DC04-FE31-6E9BA00AFBDF}"/>
-                </a:ext>
-              </a:extLst>
-            </p:cNvPr>
-            <p:cNvSpPr txBox="1"/>
-            <p:nvPr/>
-          </p:nvSpPr>
-          <p:spPr>
-            <a:xfrm>
-              <a:off x="2104686" y="4024906"/>
-              <a:ext cx="3314818" cy="369332"/>
-            </a:xfrm>
-            <a:prstGeom prst="rect">
-              <a:avLst/>
-            </a:prstGeom>
-            <a:noFill/>
-          </p:spPr>
-          <p:txBody>
-            <a:bodyPr wrap="none" rtlCol="0">
-              <a:spAutoFit/>
-            </a:bodyPr>
-            <a:lstStyle/>
-            <a:p>
-              <a:r>
-                <a:rPr lang="fr-FR" dirty="0">
-                  <a:solidFill>
-                    <a:schemeClr val="accent2">
-                      <a:lumMod val="75000"/>
-                    </a:schemeClr>
-                  </a:solidFill>
-                  <a:sym typeface="Wingdings" panose="05000000000000000000" pitchFamily="2" charset="2"/>
-                </a:rPr>
-                <a:t>durée d’exécution du programme</a:t>
-              </a:r>
-              <a:endParaRPr lang="fr-FR" dirty="0">
-                <a:solidFill>
-                  <a:schemeClr val="accent2">
-                    <a:lumMod val="75000"/>
-                  </a:schemeClr>
-                </a:solidFill>
-              </a:endParaRPr>
-            </a:p>
-          </p:txBody>
-        </p:sp>
-        <p:sp>
-          <p:nvSpPr>
-            <p:cNvPr id="33" name="ZoneTexte 32">
-              <a:extLst>
-                <a:ext uri="{FF2B5EF4-FFF2-40B4-BE49-F238E27FC236}">
-                  <a16:creationId xmlns:a16="http://schemas.microsoft.com/office/drawing/2014/main" id="{2B530253-D20B-DEBA-BED8-61BF3A22FEBE}"/>
-                </a:ext>
-              </a:extLst>
-            </p:cNvPr>
-            <p:cNvSpPr txBox="1"/>
-            <p:nvPr/>
-          </p:nvSpPr>
-          <p:spPr>
-            <a:xfrm>
-              <a:off x="904148" y="3243032"/>
-              <a:ext cx="343364" cy="369332"/>
-            </a:xfrm>
-            <a:prstGeom prst="rect">
-              <a:avLst/>
-            </a:prstGeom>
-            <a:noFill/>
-          </p:spPr>
-          <p:txBody>
-            <a:bodyPr wrap="none" rtlCol="0">
-              <a:spAutoFit/>
-            </a:bodyPr>
-            <a:lstStyle/>
-            <a:p>
-              <a:r>
-                <a:rPr lang="fr-FR" dirty="0"/>
-                <a:t>…</a:t>
-              </a:r>
-            </a:p>
-          </p:txBody>
-        </p:sp>
-      </p:grpSp>
-    </p:spTree>
-    <p:extLst>
-      <p:ext uri="{BB962C8B-B14F-4D97-AF65-F5344CB8AC3E}">
-        <p14:creationId xmlns:p14="http://schemas.microsoft.com/office/powerpoint/2010/main" val="725568094"/>
       </p:ext>
     </p:extLst>
   </p:cSld>
@@ -5234,12 +5356,170 @@
           <a:chExt cx="0" cy="0"/>
         </a:xfrm>
       </p:grpSpPr>
+      <p:sp>
+        <p:nvSpPr>
+          <p:cNvPr id="5" name="ZoneTexte 4">
+            <a:extLst>
+              <a:ext uri="{FF2B5EF4-FFF2-40B4-BE49-F238E27FC236}">
+                <a16:creationId xmlns:a16="http://schemas.microsoft.com/office/drawing/2014/main" id="{626AA162-95AD-CBC2-B5F0-1D3AB49269BB}"/>
+              </a:ext>
+            </a:extLst>
+          </p:cNvPr>
+          <p:cNvSpPr txBox="1"/>
+          <p:nvPr/>
+        </p:nvSpPr>
+        <p:spPr>
+          <a:xfrm>
+            <a:off x="504203" y="688885"/>
+            <a:ext cx="4579202" cy="461665"/>
+          </a:xfrm>
+          <a:prstGeom prst="rect">
+            <a:avLst/>
+          </a:prstGeom>
+          <a:noFill/>
+        </p:spPr>
+        <p:txBody>
+          <a:bodyPr wrap="none" rtlCol="0">
+            <a:spAutoFit/>
+          </a:bodyPr>
+          <a:lstStyle/>
+          <a:p>
+            <a:r>
+              <a:rPr lang="fr-FR" sz="2400" b="1" dirty="0"/>
+              <a:t>4. Exécuter le programme vigie.py </a:t>
+            </a:r>
+          </a:p>
+        </p:txBody>
+      </p:sp>
+      <p:sp>
+        <p:nvSpPr>
+          <p:cNvPr id="8" name="ZoneTexte 7">
+            <a:extLst>
+              <a:ext uri="{FF2B5EF4-FFF2-40B4-BE49-F238E27FC236}">
+                <a16:creationId xmlns:a16="http://schemas.microsoft.com/office/drawing/2014/main" id="{608F3690-D37A-7A77-C561-9551F30E17A3}"/>
+              </a:ext>
+            </a:extLst>
+          </p:cNvPr>
+          <p:cNvSpPr txBox="1"/>
+          <p:nvPr/>
+        </p:nvSpPr>
+        <p:spPr>
+          <a:xfrm>
+            <a:off x="-1" y="5063638"/>
+            <a:ext cx="12191999" cy="1354217"/>
+          </a:xfrm>
+          <a:prstGeom prst="rect">
+            <a:avLst/>
+          </a:prstGeom>
+          <a:noFill/>
+        </p:spPr>
+        <p:txBody>
+          <a:bodyPr wrap="square" rtlCol="0">
+            <a:spAutoFit/>
+          </a:bodyPr>
+          <a:lstStyle/>
+          <a:p>
+            <a:pPr algn="ctr"/>
+            <a:r>
+              <a:rPr lang="fr-FR" dirty="0"/>
+              <a:t>Écrire en respectant les espaces et les majuscules :</a:t>
+            </a:r>
+            <a:br>
+              <a:rPr lang="fr-FR" dirty="0"/>
+            </a:br>
+            <a:r>
+              <a:rPr lang="fr-FR" dirty="0"/>
+              <a:t>TWAV_Splitter.py -i </a:t>
+            </a:r>
+            <a:r>
+              <a:rPr lang="fr-FR" b="1" dirty="0"/>
+              <a:t>coller le chemin d’accès au </a:t>
+            </a:r>
+            <a:r>
+              <a:rPr lang="fr-FR" b="1" dirty="0">
+                <a:solidFill>
+                  <a:srgbClr val="3E8E5B"/>
+                </a:solidFill>
+              </a:rPr>
+              <a:t>dossier source</a:t>
+            </a:r>
+            <a:r>
+              <a:rPr lang="fr-FR" dirty="0">
+                <a:solidFill>
+                  <a:srgbClr val="3E8E5B"/>
+                </a:solidFill>
+              </a:rPr>
+              <a:t> </a:t>
+            </a:r>
+            <a:r>
+              <a:rPr lang="fr-FR" dirty="0"/>
+              <a:t>-o </a:t>
+            </a:r>
+            <a:r>
+              <a:rPr lang="fr-FR" b="1" dirty="0"/>
+              <a:t>coller le chemin d’accès au </a:t>
+            </a:r>
+            <a:r>
+              <a:rPr lang="fr-FR" b="1" dirty="0">
+                <a:solidFill>
+                  <a:srgbClr val="3E8E5B"/>
+                </a:solidFill>
+              </a:rPr>
+              <a:t>dossier de sortie</a:t>
+            </a:r>
+            <a:endParaRPr lang="fr-FR" dirty="0"/>
+          </a:p>
+          <a:p>
+            <a:pPr algn="ctr"/>
+            <a:r>
+              <a:rPr lang="fr-FR" sz="1200" dirty="0"/>
+              <a:t>(Pour récupérer les chemins d’accès aux dossiers T.Wav (</a:t>
+            </a:r>
+            <a:r>
+              <a:rPr lang="fr-FR" sz="1200" dirty="0">
+                <a:solidFill>
+                  <a:srgbClr val="3E8E5B"/>
+                </a:solidFill>
+              </a:rPr>
+              <a:t>source</a:t>
+            </a:r>
+            <a:r>
+              <a:rPr lang="fr-FR" sz="1200" dirty="0"/>
+              <a:t>) et .Wav (</a:t>
+            </a:r>
+            <a:r>
+              <a:rPr lang="fr-FR" sz="1200" dirty="0">
+                <a:solidFill>
+                  <a:srgbClr val="3E8E5B"/>
+                </a:solidFill>
+              </a:rPr>
+              <a:t>de sortie</a:t>
+            </a:r>
+            <a:r>
+              <a:rPr lang="fr-FR" sz="1200" dirty="0"/>
+              <a:t>), suivre la méthode vu à l’étape 1 : Ouvrir le dossier » cliquer » Copier [Ctrl C] » Coller [Ctrl V])</a:t>
+            </a:r>
+          </a:p>
+          <a:p>
+            <a:pPr algn="ctr"/>
+            <a:endParaRPr lang="fr-FR" sz="1400" dirty="0"/>
+          </a:p>
+          <a:p>
+            <a:pPr algn="ctr"/>
+            <a:r>
+              <a:rPr lang="fr-FR" dirty="0"/>
+              <a:t>Continuer avec l’étape 5 ou exécuter le programme en appuyant sur la touche [Entrée]</a:t>
+            </a:r>
+            <a:endParaRPr lang="fr-FR" b="1" dirty="0"/>
+          </a:p>
+        </p:txBody>
+      </p:sp>
       <p:pic>
         <p:nvPicPr>
-          <p:cNvPr id="21" name="Image 20">
-            <a:extLst>
-              <a:ext uri="{FF2B5EF4-FFF2-40B4-BE49-F238E27FC236}">
-                <a16:creationId xmlns:a16="http://schemas.microsoft.com/office/drawing/2014/main" id="{A6249991-E28A-AA45-7632-492BFB9979E1}"/>
+          <p:cNvPr id="3" name="Image 2">
+            <a:extLst>
+              <a:ext uri="{FF2B5EF4-FFF2-40B4-BE49-F238E27FC236}">
+                <a16:creationId xmlns:a16="http://schemas.microsoft.com/office/drawing/2014/main" id="{C56FE0C4-44C0-4D54-CF5C-B98755F281AA}"/>
               </a:ext>
             </a:extLst>
           </p:cNvPr>
@@ -5256,8 +5536,8 @@
         </p:blipFill>
         <p:spPr>
           <a:xfrm>
-            <a:off x="358368" y="2819315"/>
-            <a:ext cx="9717502" cy="1072276"/>
+            <a:off x="885099" y="1418953"/>
+            <a:ext cx="10421802" cy="1894135"/>
           </a:xfrm>
           <a:prstGeom prst="rect">
             <a:avLst/>
@@ -5266,388 +5546,10 @@
       </p:pic>
       <p:sp>
         <p:nvSpPr>
-          <p:cNvPr id="5" name="ZoneTexte 4">
-            <a:extLst>
-              <a:ext uri="{FF2B5EF4-FFF2-40B4-BE49-F238E27FC236}">
-                <a16:creationId xmlns:a16="http://schemas.microsoft.com/office/drawing/2014/main" id="{626AA162-95AD-CBC2-B5F0-1D3AB49269BB}"/>
-              </a:ext>
-            </a:extLst>
-          </p:cNvPr>
-          <p:cNvSpPr txBox="1"/>
-          <p:nvPr/>
-        </p:nvSpPr>
-        <p:spPr>
-          <a:xfrm>
-            <a:off x="504203" y="688885"/>
-            <a:ext cx="10923760" cy="461665"/>
-          </a:xfrm>
-          <a:prstGeom prst="rect">
-            <a:avLst/>
-          </a:prstGeom>
-          <a:noFill/>
-        </p:spPr>
-        <p:txBody>
-          <a:bodyPr wrap="none" rtlCol="0">
-            <a:spAutoFit/>
-          </a:bodyPr>
-          <a:lstStyle/>
-          <a:p>
-            <a:r>
-              <a:rPr lang="fr-FR" sz="2400" b="1" dirty="0"/>
-              <a:t>4. Accélérer le traitement en précisant le nombre de processus simultanés </a:t>
-            </a:r>
-            <a:r>
-              <a:rPr lang="fr-FR" sz="2400" dirty="0"/>
-              <a:t>(facultatif)</a:t>
-            </a:r>
-          </a:p>
-        </p:txBody>
-      </p:sp>
-      <p:sp>
-        <p:nvSpPr>
-          <p:cNvPr id="4" name="ZoneTexte 3">
-            <a:extLst>
-              <a:ext uri="{FF2B5EF4-FFF2-40B4-BE49-F238E27FC236}">
-                <a16:creationId xmlns:a16="http://schemas.microsoft.com/office/drawing/2014/main" id="{DE5FDE47-91B8-F569-DA32-E98A8952B6EB}"/>
-              </a:ext>
-            </a:extLst>
-          </p:cNvPr>
-          <p:cNvSpPr txBox="1"/>
-          <p:nvPr/>
-        </p:nvSpPr>
-        <p:spPr>
-          <a:xfrm>
-            <a:off x="0" y="1150550"/>
-            <a:ext cx="12191999" cy="923330"/>
-          </a:xfrm>
-          <a:prstGeom prst="rect">
-            <a:avLst/>
-          </a:prstGeom>
-          <a:noFill/>
-        </p:spPr>
-        <p:txBody>
-          <a:bodyPr wrap="square" rtlCol="0">
-            <a:spAutoFit/>
-          </a:bodyPr>
-          <a:lstStyle/>
-          <a:p>
-            <a:pPr algn="ctr"/>
-            <a:r>
-              <a:rPr lang="fr-FR" dirty="0"/>
-              <a:t>Ajouter en respectant les espaces : </a:t>
-            </a:r>
-            <a:r>
-              <a:rPr lang="fr-FR" dirty="0">
-                <a:solidFill>
-                  <a:schemeClr val="bg1">
-                    <a:lumMod val="75000"/>
-                  </a:schemeClr>
-                </a:solidFill>
-              </a:rPr>
-              <a:t>vigie.py -i dossier source -o dossier de sortie</a:t>
-            </a:r>
-            <a:r>
-              <a:rPr lang="fr-FR" dirty="0"/>
-              <a:t> -n </a:t>
-            </a:r>
-            <a:r>
-              <a:rPr lang="fr-FR" b="1" dirty="0">
-                <a:solidFill>
-                  <a:schemeClr val="accent2">
-                    <a:lumMod val="75000"/>
-                  </a:schemeClr>
-                </a:solidFill>
-              </a:rPr>
-              <a:t>X</a:t>
-            </a:r>
-          </a:p>
-          <a:p>
-            <a:pPr algn="ctr"/>
-            <a:r>
-              <a:rPr lang="fr-FR" b="1" dirty="0">
-                <a:solidFill>
-                  <a:schemeClr val="accent2">
-                    <a:lumMod val="75000"/>
-                  </a:schemeClr>
-                </a:solidFill>
-              </a:rPr>
-              <a:t>X </a:t>
-            </a:r>
-            <a:r>
-              <a:rPr lang="fr-FR" dirty="0"/>
-              <a:t>: un chiffre entier ; 2 est la valeur par défaut ; 6 semble bien fonctionner</a:t>
-            </a:r>
-          </a:p>
-          <a:p>
-            <a:pPr algn="ctr"/>
-            <a:r>
-              <a:rPr lang="fr-FR" b="1" dirty="0">
-                <a:solidFill>
-                  <a:schemeClr val="accent2">
-                    <a:lumMod val="75000"/>
-                  </a:schemeClr>
-                </a:solidFill>
-              </a:rPr>
-              <a:t>X</a:t>
-            </a:r>
-            <a:r>
-              <a:rPr lang="fr-FR" dirty="0"/>
-              <a:t> est le nombre de fichiers T.Wav traité en même temps, vous pouvez le faire varier pour trouver ce qui fonctionne le mieux</a:t>
-            </a:r>
-            <a:endParaRPr lang="fr-FR" b="1" dirty="0">
-              <a:solidFill>
-                <a:schemeClr val="accent2">
-                  <a:lumMod val="75000"/>
-                </a:schemeClr>
-              </a:solidFill>
-            </a:endParaRPr>
-          </a:p>
-        </p:txBody>
-      </p:sp>
-      <p:pic>
-        <p:nvPicPr>
-          <p:cNvPr id="17" name="Image 16">
-            <a:extLst>
-              <a:ext uri="{FF2B5EF4-FFF2-40B4-BE49-F238E27FC236}">
-                <a16:creationId xmlns:a16="http://schemas.microsoft.com/office/drawing/2014/main" id="{35E816F5-F48F-28BB-5503-37C4168E25D9}"/>
-              </a:ext>
-            </a:extLst>
-          </p:cNvPr>
-          <p:cNvPicPr>
-            <a:picLocks noChangeAspect="1"/>
-          </p:cNvPicPr>
-          <p:nvPr/>
-        </p:nvPicPr>
-        <p:blipFill rotWithShape="1">
-          <a:blip r:embed="rId3"/>
-          <a:srcRect l="1963"/>
-          <a:stretch/>
-        </p:blipFill>
-        <p:spPr>
-          <a:xfrm>
-            <a:off x="358368" y="4041656"/>
-            <a:ext cx="993735" cy="150789"/>
-          </a:xfrm>
-          <a:prstGeom prst="rect">
-            <a:avLst/>
-          </a:prstGeom>
-          <a:ln w="19050">
-            <a:solidFill>
-              <a:srgbClr val="C55A11"/>
-            </a:solidFill>
-          </a:ln>
-        </p:spPr>
-      </p:pic>
-      <p:sp>
-        <p:nvSpPr>
-          <p:cNvPr id="19" name="ZoneTexte 18">
-            <a:extLst>
-              <a:ext uri="{FF2B5EF4-FFF2-40B4-BE49-F238E27FC236}">
-                <a16:creationId xmlns:a16="http://schemas.microsoft.com/office/drawing/2014/main" id="{9340EFF1-3B07-2E35-C9AD-8C4CD30F7A3E}"/>
-              </a:ext>
-            </a:extLst>
-          </p:cNvPr>
-          <p:cNvSpPr txBox="1"/>
-          <p:nvPr/>
-        </p:nvSpPr>
-        <p:spPr>
-          <a:xfrm>
-            <a:off x="358368" y="2447013"/>
-            <a:ext cx="2712024" cy="369332"/>
-          </a:xfrm>
-          <a:prstGeom prst="rect">
-            <a:avLst/>
-          </a:prstGeom>
-          <a:noFill/>
-        </p:spPr>
-        <p:txBody>
-          <a:bodyPr wrap="none" rtlCol="0">
-            <a:spAutoFit/>
-          </a:bodyPr>
-          <a:lstStyle/>
-          <a:p>
-            <a:r>
-              <a:rPr lang="fr-FR" dirty="0"/>
-              <a:t>Par défaut, 12.9 secondes :</a:t>
-            </a:r>
-          </a:p>
-        </p:txBody>
-      </p:sp>
-      <p:sp>
-        <p:nvSpPr>
-          <p:cNvPr id="22" name="ZoneTexte 21">
-            <a:extLst>
-              <a:ext uri="{FF2B5EF4-FFF2-40B4-BE49-F238E27FC236}">
-                <a16:creationId xmlns:a16="http://schemas.microsoft.com/office/drawing/2014/main" id="{401867B0-9988-4114-01FF-0006B71ABBD0}"/>
-              </a:ext>
-            </a:extLst>
-          </p:cNvPr>
-          <p:cNvSpPr txBox="1"/>
-          <p:nvPr/>
-        </p:nvSpPr>
-        <p:spPr>
-          <a:xfrm>
-            <a:off x="306883" y="3727733"/>
-            <a:ext cx="343364" cy="369332"/>
-          </a:xfrm>
-          <a:prstGeom prst="rect">
-            <a:avLst/>
-          </a:prstGeom>
-          <a:noFill/>
-        </p:spPr>
-        <p:txBody>
-          <a:bodyPr wrap="none" rtlCol="0">
-            <a:spAutoFit/>
-          </a:bodyPr>
-          <a:lstStyle/>
-          <a:p>
-            <a:r>
-              <a:rPr lang="fr-FR" dirty="0"/>
-              <a:t>…</a:t>
-            </a:r>
-          </a:p>
-        </p:txBody>
-      </p:sp>
-      <p:pic>
-        <p:nvPicPr>
-          <p:cNvPr id="25" name="Image 24">
-            <a:extLst>
-              <a:ext uri="{FF2B5EF4-FFF2-40B4-BE49-F238E27FC236}">
-                <a16:creationId xmlns:a16="http://schemas.microsoft.com/office/drawing/2014/main" id="{03473D79-1F76-80E1-CC04-27B864C6C0F8}"/>
-              </a:ext>
-            </a:extLst>
-          </p:cNvPr>
-          <p:cNvPicPr>
-            <a:picLocks noChangeAspect="1"/>
-          </p:cNvPicPr>
-          <p:nvPr/>
-        </p:nvPicPr>
-        <p:blipFill rotWithShape="1">
-          <a:blip r:embed="rId4"/>
-          <a:srcRect l="86"/>
-          <a:stretch/>
-        </p:blipFill>
-        <p:spPr>
-          <a:xfrm>
-            <a:off x="358369" y="4800009"/>
-            <a:ext cx="9717502" cy="1625168"/>
-          </a:xfrm>
-          <a:prstGeom prst="rect">
-            <a:avLst/>
-          </a:prstGeom>
-        </p:spPr>
-      </p:pic>
-      <p:sp>
-        <p:nvSpPr>
-          <p:cNvPr id="27" name="ZoneTexte 26">
-            <a:extLst>
-              <a:ext uri="{FF2B5EF4-FFF2-40B4-BE49-F238E27FC236}">
-                <a16:creationId xmlns:a16="http://schemas.microsoft.com/office/drawing/2014/main" id="{DF63F269-91D3-51CB-56CB-30FD60AB772C}"/>
-              </a:ext>
-            </a:extLst>
-          </p:cNvPr>
-          <p:cNvSpPr txBox="1"/>
-          <p:nvPr/>
-        </p:nvSpPr>
-        <p:spPr>
-          <a:xfrm>
-            <a:off x="306883" y="6294544"/>
-            <a:ext cx="343364" cy="369332"/>
-          </a:xfrm>
-          <a:prstGeom prst="rect">
-            <a:avLst/>
-          </a:prstGeom>
-          <a:noFill/>
-        </p:spPr>
-        <p:txBody>
-          <a:bodyPr wrap="none" rtlCol="0">
-            <a:spAutoFit/>
-          </a:bodyPr>
-          <a:lstStyle/>
-          <a:p>
-            <a:r>
-              <a:rPr lang="fr-FR" dirty="0"/>
-              <a:t>…</a:t>
-            </a:r>
-          </a:p>
-        </p:txBody>
-      </p:sp>
-      <p:pic>
-        <p:nvPicPr>
-          <p:cNvPr id="29" name="Image 28">
-            <a:extLst>
-              <a:ext uri="{FF2B5EF4-FFF2-40B4-BE49-F238E27FC236}">
-                <a16:creationId xmlns:a16="http://schemas.microsoft.com/office/drawing/2014/main" id="{7469C8DC-89B1-1A32-C9E3-29B7A3513FC1}"/>
-              </a:ext>
-            </a:extLst>
-          </p:cNvPr>
-          <p:cNvPicPr>
-            <a:picLocks noChangeAspect="1"/>
-          </p:cNvPicPr>
-          <p:nvPr/>
-        </p:nvPicPr>
-        <p:blipFill>
-          <a:blip r:embed="rId5"/>
-          <a:stretch>
-            <a:fillRect/>
-          </a:stretch>
-        </p:blipFill>
-        <p:spPr>
-          <a:xfrm>
-            <a:off x="358368" y="6617720"/>
-            <a:ext cx="993735" cy="171334"/>
-          </a:xfrm>
-          <a:prstGeom prst="rect">
-            <a:avLst/>
-          </a:prstGeom>
-          <a:ln w="19050">
-            <a:solidFill>
-              <a:srgbClr val="C55A11"/>
-            </a:solidFill>
-          </a:ln>
-        </p:spPr>
-      </p:pic>
-      <p:sp>
-        <p:nvSpPr>
-          <p:cNvPr id="30" name="ZoneTexte 29">
-            <a:extLst>
-              <a:ext uri="{FF2B5EF4-FFF2-40B4-BE49-F238E27FC236}">
-                <a16:creationId xmlns:a16="http://schemas.microsoft.com/office/drawing/2014/main" id="{6807A695-3458-0692-87FE-F7C815821061}"/>
-              </a:ext>
-            </a:extLst>
-          </p:cNvPr>
-          <p:cNvSpPr txBox="1"/>
-          <p:nvPr/>
-        </p:nvSpPr>
-        <p:spPr>
-          <a:xfrm>
-            <a:off x="358368" y="4430677"/>
-            <a:ext cx="11798423" cy="369332"/>
-          </a:xfrm>
-          <a:prstGeom prst="rect">
-            <a:avLst/>
-          </a:prstGeom>
-          <a:noFill/>
-        </p:spPr>
-        <p:txBody>
-          <a:bodyPr wrap="none" rtlCol="0">
-            <a:spAutoFit/>
-          </a:bodyPr>
-          <a:lstStyle/>
-          <a:p>
-            <a:r>
-              <a:rPr lang="fr-FR" dirty="0"/>
-              <a:t>Avec -n 6, on passe à 6.2 secondes soit plus de 2 fois plus rapide (peut être intéressant avec beaucoup de fichiers à traiter) </a:t>
-            </a:r>
-          </a:p>
-        </p:txBody>
-      </p:sp>
-      <p:sp>
-        <p:nvSpPr>
-          <p:cNvPr id="32" name="Rectangle 31">
-            <a:extLst>
-              <a:ext uri="{FF2B5EF4-FFF2-40B4-BE49-F238E27FC236}">
-                <a16:creationId xmlns:a16="http://schemas.microsoft.com/office/drawing/2014/main" id="{ED4DAC33-86D3-0493-D07F-249E3649AD75}"/>
+          <p:cNvPr id="6" name="Rectangle 5">
+            <a:extLst>
+              <a:ext uri="{FF2B5EF4-FFF2-40B4-BE49-F238E27FC236}">
+                <a16:creationId xmlns:a16="http://schemas.microsoft.com/office/drawing/2014/main" id="{A643D0C3-418F-6323-649A-102C801DA51B}"/>
               </a:ext>
             </a:extLst>
           </p:cNvPr>
@@ -5656,8 +5558,8 @@
         </p:nvSpPr>
         <p:spPr>
           <a:xfrm>
-            <a:off x="9584531" y="4800009"/>
-            <a:ext cx="402432" cy="141085"/>
+            <a:off x="4002881" y="2281776"/>
+            <a:ext cx="6703219" cy="201826"/>
           </a:xfrm>
           <a:prstGeom prst="rect">
             <a:avLst/>
@@ -5694,12 +5596,572 @@
           </a:p>
         </p:txBody>
       </p:sp>
+      <p:sp>
+        <p:nvSpPr>
+          <p:cNvPr id="9" name="ZoneTexte 8">
+            <a:extLst>
+              <a:ext uri="{FF2B5EF4-FFF2-40B4-BE49-F238E27FC236}">
+                <a16:creationId xmlns:a16="http://schemas.microsoft.com/office/drawing/2014/main" id="{07DD5BAC-2620-C092-601F-A4385786692D}"/>
+              </a:ext>
+            </a:extLst>
+          </p:cNvPr>
+          <p:cNvSpPr txBox="1"/>
+          <p:nvPr/>
+        </p:nvSpPr>
+        <p:spPr>
+          <a:xfrm>
+            <a:off x="885098" y="3259224"/>
+            <a:ext cx="343364" cy="369332"/>
+          </a:xfrm>
+          <a:prstGeom prst="rect">
+            <a:avLst/>
+          </a:prstGeom>
+          <a:noFill/>
+        </p:spPr>
+        <p:txBody>
+          <a:bodyPr wrap="none" rtlCol="0">
+            <a:spAutoFit/>
+          </a:bodyPr>
+          <a:lstStyle/>
+          <a:p>
+            <a:r>
+              <a:rPr lang="fr-FR" dirty="0"/>
+              <a:t>…</a:t>
+            </a:r>
+          </a:p>
+        </p:txBody>
+      </p:sp>
+      <p:pic>
+        <p:nvPicPr>
+          <p:cNvPr id="11" name="Image 10">
+            <a:extLst>
+              <a:ext uri="{FF2B5EF4-FFF2-40B4-BE49-F238E27FC236}">
+                <a16:creationId xmlns:a16="http://schemas.microsoft.com/office/drawing/2014/main" id="{CF2E08B2-742D-B1C6-391A-2546D3D24C86}"/>
+              </a:ext>
+            </a:extLst>
+          </p:cNvPr>
+          <p:cNvPicPr>
+            <a:picLocks noChangeAspect="1"/>
+          </p:cNvPicPr>
+          <p:nvPr/>
+        </p:nvPicPr>
+        <p:blipFill>
+          <a:blip r:embed="rId3"/>
+          <a:stretch>
+            <a:fillRect/>
+          </a:stretch>
+        </p:blipFill>
+        <p:spPr>
+          <a:xfrm>
+            <a:off x="885098" y="3668086"/>
+            <a:ext cx="10421803" cy="1040554"/>
+          </a:xfrm>
+          <a:prstGeom prst="rect">
+            <a:avLst/>
+          </a:prstGeom>
+        </p:spPr>
+      </p:pic>
+      <p:sp>
+        <p:nvSpPr>
+          <p:cNvPr id="12" name="Rectangle 11">
+            <a:extLst>
+              <a:ext uri="{FF2B5EF4-FFF2-40B4-BE49-F238E27FC236}">
+                <a16:creationId xmlns:a16="http://schemas.microsoft.com/office/drawing/2014/main" id="{67A62301-ADF7-6A22-9B66-BFBDA92B67DD}"/>
+              </a:ext>
+            </a:extLst>
+          </p:cNvPr>
+          <p:cNvSpPr/>
+          <p:nvPr/>
+        </p:nvSpPr>
+        <p:spPr>
+          <a:xfrm>
+            <a:off x="885098" y="4217471"/>
+            <a:ext cx="1061812" cy="201826"/>
+          </a:xfrm>
+          <a:prstGeom prst="rect">
+            <a:avLst/>
+          </a:prstGeom>
+          <a:noFill/>
+          <a:ln w="38100">
+            <a:solidFill>
+              <a:schemeClr val="accent2">
+                <a:lumMod val="75000"/>
+              </a:schemeClr>
+            </a:solidFill>
+          </a:ln>
+        </p:spPr>
+        <p:style>
+          <a:lnRef idx="2">
+            <a:schemeClr val="accent1">
+              <a:shade val="50000"/>
+            </a:schemeClr>
+          </a:lnRef>
+          <a:fillRef idx="1">
+            <a:schemeClr val="accent1"/>
+          </a:fillRef>
+          <a:effectRef idx="0">
+            <a:schemeClr val="accent1"/>
+          </a:effectRef>
+          <a:fontRef idx="minor">
+            <a:schemeClr val="lt1"/>
+          </a:fontRef>
+        </p:style>
+        <p:txBody>
+          <a:bodyPr rtlCol="0" anchor="ctr"/>
+          <a:lstStyle/>
+          <a:p>
+            <a:pPr algn="ctr"/>
+            <a:endParaRPr lang="fr-FR" dirty="0"/>
+          </a:p>
+        </p:txBody>
+      </p:sp>
+      <p:sp>
+        <p:nvSpPr>
+          <p:cNvPr id="13" name="ZoneTexte 12">
+            <a:extLst>
+              <a:ext uri="{FF2B5EF4-FFF2-40B4-BE49-F238E27FC236}">
+                <a16:creationId xmlns:a16="http://schemas.microsoft.com/office/drawing/2014/main" id="{B6978C69-D1B5-0048-9E50-265C5570EC1D}"/>
+              </a:ext>
+            </a:extLst>
+          </p:cNvPr>
+          <p:cNvSpPr txBox="1"/>
+          <p:nvPr/>
+        </p:nvSpPr>
+        <p:spPr>
+          <a:xfrm>
+            <a:off x="2026349" y="4133718"/>
+            <a:ext cx="3314818" cy="369332"/>
+          </a:xfrm>
+          <a:prstGeom prst="rect">
+            <a:avLst/>
+          </a:prstGeom>
+          <a:noFill/>
+        </p:spPr>
+        <p:txBody>
+          <a:bodyPr wrap="none" rtlCol="0">
+            <a:spAutoFit/>
+          </a:bodyPr>
+          <a:lstStyle/>
+          <a:p>
+            <a:r>
+              <a:rPr lang="fr-FR" dirty="0">
+                <a:solidFill>
+                  <a:schemeClr val="accent2">
+                    <a:lumMod val="75000"/>
+                  </a:schemeClr>
+                </a:solidFill>
+                <a:sym typeface="Wingdings" panose="05000000000000000000" pitchFamily="2" charset="2"/>
+              </a:rPr>
+              <a:t>durée d’exécution du programme</a:t>
+            </a:r>
+            <a:endParaRPr lang="fr-FR" dirty="0">
+              <a:solidFill>
+                <a:schemeClr val="accent2">
+                  <a:lumMod val="75000"/>
+                </a:schemeClr>
+              </a:solidFill>
+            </a:endParaRPr>
+          </a:p>
+        </p:txBody>
+      </p:sp>
+    </p:spTree>
+    <p:extLst>
+      <p:ext uri="{BB962C8B-B14F-4D97-AF65-F5344CB8AC3E}">
+        <p14:creationId xmlns:p14="http://schemas.microsoft.com/office/powerpoint/2010/main" val="725568094"/>
+      </p:ext>
+    </p:extLst>
+  </p:cSld>
+  <p:clrMapOvr>
+    <a:masterClrMapping/>
+  </p:clrMapOvr>
+</p:sld>
+</file>
+
+<file path=ppt/slides/slide7.xml><?xml version="1.0" encoding="utf-8"?>
+<p:sld xmlns:a="http://schemas.openxmlformats.org/drawingml/2006/main" xmlns:r="http://schemas.openxmlformats.org/officeDocument/2006/relationships" xmlns:p="http://schemas.openxmlformats.org/presentationml/2006/main">
+  <p:cSld>
+    <p:spTree>
+      <p:nvGrpSpPr>
+        <p:cNvPr id="1" name=""/>
+        <p:cNvGrpSpPr/>
+        <p:nvPr/>
+      </p:nvGrpSpPr>
+      <p:grpSpPr>
+        <a:xfrm>
+          <a:off x="0" y="0"/>
+          <a:ext cx="0" cy="0"/>
+          <a:chOff x="0" y="0"/>
+          <a:chExt cx="0" cy="0"/>
+        </a:xfrm>
+      </p:grpSpPr>
+      <p:pic>
+        <p:nvPicPr>
+          <p:cNvPr id="12" name="Image 11">
+            <a:extLst>
+              <a:ext uri="{FF2B5EF4-FFF2-40B4-BE49-F238E27FC236}">
+                <a16:creationId xmlns:a16="http://schemas.microsoft.com/office/drawing/2014/main" id="{08136B92-EF90-AFFB-4471-93D4CD157719}"/>
+              </a:ext>
+            </a:extLst>
+          </p:cNvPr>
+          <p:cNvPicPr>
+            <a:picLocks noChangeAspect="1"/>
+          </p:cNvPicPr>
+          <p:nvPr/>
+        </p:nvPicPr>
+        <p:blipFill>
+          <a:blip r:embed="rId2"/>
+          <a:stretch>
+            <a:fillRect/>
+          </a:stretch>
+        </p:blipFill>
+        <p:spPr>
+          <a:xfrm>
+            <a:off x="358368" y="4807433"/>
+            <a:ext cx="9717502" cy="1478415"/>
+          </a:xfrm>
+          <a:prstGeom prst="rect">
+            <a:avLst/>
+          </a:prstGeom>
+        </p:spPr>
+      </p:pic>
+      <p:sp>
+        <p:nvSpPr>
+          <p:cNvPr id="5" name="ZoneTexte 4">
+            <a:extLst>
+              <a:ext uri="{FF2B5EF4-FFF2-40B4-BE49-F238E27FC236}">
+                <a16:creationId xmlns:a16="http://schemas.microsoft.com/office/drawing/2014/main" id="{626AA162-95AD-CBC2-B5F0-1D3AB49269BB}"/>
+              </a:ext>
+            </a:extLst>
+          </p:cNvPr>
+          <p:cNvSpPr txBox="1"/>
+          <p:nvPr/>
+        </p:nvSpPr>
+        <p:spPr>
+          <a:xfrm>
+            <a:off x="504203" y="688885"/>
+            <a:ext cx="10923760" cy="461665"/>
+          </a:xfrm>
+          <a:prstGeom prst="rect">
+            <a:avLst/>
+          </a:prstGeom>
+          <a:noFill/>
+        </p:spPr>
+        <p:txBody>
+          <a:bodyPr wrap="none" rtlCol="0">
+            <a:spAutoFit/>
+          </a:bodyPr>
+          <a:lstStyle/>
+          <a:p>
+            <a:r>
+              <a:rPr lang="fr-FR" sz="2400" b="1" dirty="0"/>
+              <a:t>5. Accélérer le traitement en précisant le nombre de processus simultanés </a:t>
+            </a:r>
+            <a:r>
+              <a:rPr lang="fr-FR" sz="2400" dirty="0"/>
+              <a:t>(facultatif)</a:t>
+            </a:r>
+          </a:p>
+        </p:txBody>
+      </p:sp>
+      <p:sp>
+        <p:nvSpPr>
+          <p:cNvPr id="4" name="ZoneTexte 3">
+            <a:extLst>
+              <a:ext uri="{FF2B5EF4-FFF2-40B4-BE49-F238E27FC236}">
+                <a16:creationId xmlns:a16="http://schemas.microsoft.com/office/drawing/2014/main" id="{DE5FDE47-91B8-F569-DA32-E98A8952B6EB}"/>
+              </a:ext>
+            </a:extLst>
+          </p:cNvPr>
+          <p:cNvSpPr txBox="1"/>
+          <p:nvPr/>
+        </p:nvSpPr>
+        <p:spPr>
+          <a:xfrm>
+            <a:off x="0" y="1150550"/>
+            <a:ext cx="12191999" cy="923330"/>
+          </a:xfrm>
+          <a:prstGeom prst="rect">
+            <a:avLst/>
+          </a:prstGeom>
+          <a:noFill/>
+        </p:spPr>
+        <p:txBody>
+          <a:bodyPr wrap="square" rtlCol="0">
+            <a:spAutoFit/>
+          </a:bodyPr>
+          <a:lstStyle/>
+          <a:p>
+            <a:pPr algn="ctr"/>
+            <a:r>
+              <a:rPr lang="fr-FR" dirty="0"/>
+              <a:t>Ajouter en respectant les espaces : </a:t>
+            </a:r>
+            <a:r>
+              <a:rPr lang="fr-FR" dirty="0">
+                <a:solidFill>
+                  <a:schemeClr val="bg1">
+                    <a:lumMod val="75000"/>
+                  </a:schemeClr>
+                </a:solidFill>
+              </a:rPr>
+              <a:t>vigie.py -i dossier source -o dossier de sortie</a:t>
+            </a:r>
+            <a:r>
+              <a:rPr lang="fr-FR" dirty="0"/>
+              <a:t> -n </a:t>
+            </a:r>
+            <a:r>
+              <a:rPr lang="fr-FR" b="1" dirty="0">
+                <a:solidFill>
+                  <a:schemeClr val="accent2">
+                    <a:lumMod val="75000"/>
+                  </a:schemeClr>
+                </a:solidFill>
+              </a:rPr>
+              <a:t>X</a:t>
+            </a:r>
+          </a:p>
+          <a:p>
+            <a:pPr algn="ctr"/>
+            <a:r>
+              <a:rPr lang="fr-FR" b="1" dirty="0">
+                <a:solidFill>
+                  <a:schemeClr val="accent2">
+                    <a:lumMod val="75000"/>
+                  </a:schemeClr>
+                </a:solidFill>
+              </a:rPr>
+              <a:t>X </a:t>
+            </a:r>
+            <a:r>
+              <a:rPr lang="fr-FR" dirty="0"/>
+              <a:t>: un chiffre entier ; 2 est la valeur par défaut ; 6 semble bien fonctionner</a:t>
+            </a:r>
+          </a:p>
+          <a:p>
+            <a:pPr algn="ctr"/>
+            <a:r>
+              <a:rPr lang="fr-FR" b="1" dirty="0">
+                <a:solidFill>
+                  <a:schemeClr val="accent2">
+                    <a:lumMod val="75000"/>
+                  </a:schemeClr>
+                </a:solidFill>
+              </a:rPr>
+              <a:t>X</a:t>
+            </a:r>
+            <a:r>
+              <a:rPr lang="fr-FR" dirty="0"/>
+              <a:t> est le nombre de fichiers T.Wav traité en même temps, vous pouvez le faire varier pour trouver ce qui fonctionne le mieux</a:t>
+            </a:r>
+            <a:endParaRPr lang="fr-FR" b="1" dirty="0">
+              <a:solidFill>
+                <a:schemeClr val="accent2">
+                  <a:lumMod val="75000"/>
+                </a:schemeClr>
+              </a:solidFill>
+            </a:endParaRPr>
+          </a:p>
+        </p:txBody>
+      </p:sp>
+      <p:sp>
+        <p:nvSpPr>
+          <p:cNvPr id="19" name="ZoneTexte 18">
+            <a:extLst>
+              <a:ext uri="{FF2B5EF4-FFF2-40B4-BE49-F238E27FC236}">
+                <a16:creationId xmlns:a16="http://schemas.microsoft.com/office/drawing/2014/main" id="{9340EFF1-3B07-2E35-C9AD-8C4CD30F7A3E}"/>
+              </a:ext>
+            </a:extLst>
+          </p:cNvPr>
+          <p:cNvSpPr txBox="1"/>
+          <p:nvPr/>
+        </p:nvSpPr>
+        <p:spPr>
+          <a:xfrm>
+            <a:off x="358368" y="2447013"/>
+            <a:ext cx="2712024" cy="369332"/>
+          </a:xfrm>
+          <a:prstGeom prst="rect">
+            <a:avLst/>
+          </a:prstGeom>
+          <a:noFill/>
+        </p:spPr>
+        <p:txBody>
+          <a:bodyPr wrap="none" rtlCol="0">
+            <a:spAutoFit/>
+          </a:bodyPr>
+          <a:lstStyle/>
+          <a:p>
+            <a:r>
+              <a:rPr lang="fr-FR" dirty="0"/>
+              <a:t>Par défaut, 36.8 secondes :</a:t>
+            </a:r>
+          </a:p>
+        </p:txBody>
+      </p:sp>
+      <p:sp>
+        <p:nvSpPr>
+          <p:cNvPr id="22" name="ZoneTexte 21">
+            <a:extLst>
+              <a:ext uri="{FF2B5EF4-FFF2-40B4-BE49-F238E27FC236}">
+                <a16:creationId xmlns:a16="http://schemas.microsoft.com/office/drawing/2014/main" id="{401867B0-9988-4114-01FF-0006B71ABBD0}"/>
+              </a:ext>
+            </a:extLst>
+          </p:cNvPr>
+          <p:cNvSpPr txBox="1"/>
+          <p:nvPr/>
+        </p:nvSpPr>
+        <p:spPr>
+          <a:xfrm>
+            <a:off x="306883" y="3727733"/>
+            <a:ext cx="343364" cy="369332"/>
+          </a:xfrm>
+          <a:prstGeom prst="rect">
+            <a:avLst/>
+          </a:prstGeom>
+          <a:noFill/>
+        </p:spPr>
+        <p:txBody>
+          <a:bodyPr wrap="none" rtlCol="0">
+            <a:spAutoFit/>
+          </a:bodyPr>
+          <a:lstStyle/>
+          <a:p>
+            <a:r>
+              <a:rPr lang="fr-FR" dirty="0"/>
+              <a:t>…</a:t>
+            </a:r>
+          </a:p>
+        </p:txBody>
+      </p:sp>
+      <p:sp>
+        <p:nvSpPr>
+          <p:cNvPr id="27" name="ZoneTexte 26">
+            <a:extLst>
+              <a:ext uri="{FF2B5EF4-FFF2-40B4-BE49-F238E27FC236}">
+                <a16:creationId xmlns:a16="http://schemas.microsoft.com/office/drawing/2014/main" id="{DF63F269-91D3-51CB-56CB-30FD60AB772C}"/>
+              </a:ext>
+            </a:extLst>
+          </p:cNvPr>
+          <p:cNvSpPr txBox="1"/>
+          <p:nvPr/>
+        </p:nvSpPr>
+        <p:spPr>
+          <a:xfrm>
+            <a:off x="306883" y="6193754"/>
+            <a:ext cx="343364" cy="369332"/>
+          </a:xfrm>
+          <a:prstGeom prst="rect">
+            <a:avLst/>
+          </a:prstGeom>
+          <a:noFill/>
+        </p:spPr>
+        <p:txBody>
+          <a:bodyPr wrap="none" rtlCol="0">
+            <a:spAutoFit/>
+          </a:bodyPr>
+          <a:lstStyle/>
+          <a:p>
+            <a:r>
+              <a:rPr lang="fr-FR" dirty="0"/>
+              <a:t>…</a:t>
+            </a:r>
+          </a:p>
+        </p:txBody>
+      </p:sp>
+      <p:sp>
+        <p:nvSpPr>
+          <p:cNvPr id="30" name="ZoneTexte 29">
+            <a:extLst>
+              <a:ext uri="{FF2B5EF4-FFF2-40B4-BE49-F238E27FC236}">
+                <a16:creationId xmlns:a16="http://schemas.microsoft.com/office/drawing/2014/main" id="{6807A695-3458-0692-87FE-F7C815821061}"/>
+              </a:ext>
+            </a:extLst>
+          </p:cNvPr>
+          <p:cNvSpPr txBox="1"/>
+          <p:nvPr/>
+        </p:nvSpPr>
+        <p:spPr>
+          <a:xfrm>
+            <a:off x="358368" y="4430677"/>
+            <a:ext cx="11798423" cy="369332"/>
+          </a:xfrm>
+          <a:prstGeom prst="rect">
+            <a:avLst/>
+          </a:prstGeom>
+          <a:noFill/>
+        </p:spPr>
+        <p:txBody>
+          <a:bodyPr wrap="none" rtlCol="0">
+            <a:spAutoFit/>
+          </a:bodyPr>
+          <a:lstStyle/>
+          <a:p>
+            <a:r>
+              <a:rPr lang="fr-FR" dirty="0"/>
+              <a:t>Avec -n 6, on passe à 17.9 secondes soit plus de 2 fois plus rapide (peut être intéressant avec beaucoup de fichiers à traiter) </a:t>
+            </a:r>
+          </a:p>
+        </p:txBody>
+      </p:sp>
+      <p:sp>
+        <p:nvSpPr>
+          <p:cNvPr id="32" name="Rectangle 31">
+            <a:extLst>
+              <a:ext uri="{FF2B5EF4-FFF2-40B4-BE49-F238E27FC236}">
+                <a16:creationId xmlns:a16="http://schemas.microsoft.com/office/drawing/2014/main" id="{ED4DAC33-86D3-0493-D07F-249E3649AD75}"/>
+              </a:ext>
+            </a:extLst>
+          </p:cNvPr>
+          <p:cNvSpPr/>
+          <p:nvPr/>
+        </p:nvSpPr>
+        <p:spPr>
+          <a:xfrm>
+            <a:off x="9628981" y="4798737"/>
+            <a:ext cx="402432" cy="141085"/>
+          </a:xfrm>
+          <a:prstGeom prst="rect">
+            <a:avLst/>
+          </a:prstGeom>
+          <a:noFill/>
+          <a:ln w="38100">
+            <a:solidFill>
+              <a:srgbClr val="FF0000"/>
+            </a:solidFill>
+          </a:ln>
+        </p:spPr>
+        <p:style>
+          <a:lnRef idx="2">
+            <a:schemeClr val="accent1">
+              <a:shade val="50000"/>
+            </a:schemeClr>
+          </a:lnRef>
+          <a:fillRef idx="1">
+            <a:schemeClr val="accent1"/>
+          </a:fillRef>
+          <a:effectRef idx="0">
+            <a:schemeClr val="accent1"/>
+          </a:effectRef>
+          <a:fontRef idx="minor">
+            <a:schemeClr val="lt1"/>
+          </a:fontRef>
+        </p:style>
+        <p:txBody>
+          <a:bodyPr rtlCol="0" anchor="ctr"/>
+          <a:lstStyle/>
+          <a:p>
+            <a:pPr algn="ctr"/>
+            <a:endParaRPr lang="fr-FR" dirty="0"/>
+          </a:p>
+        </p:txBody>
+      </p:sp>
       <p:cxnSp>
         <p:nvCxnSpPr>
-          <p:cNvPr id="34" name="Connecteur droit 33">
-            <a:extLst>
-              <a:ext uri="{FF2B5EF4-FFF2-40B4-BE49-F238E27FC236}">
-                <a16:creationId xmlns:a16="http://schemas.microsoft.com/office/drawing/2014/main" id="{99EF2EE8-47B3-0BDE-442A-039BDF536617}"/>
+          <p:cNvPr id="36" name="Connecteur droit 35">
+            <a:extLst>
+              <a:ext uri="{FF2B5EF4-FFF2-40B4-BE49-F238E27FC236}">
+                <a16:creationId xmlns:a16="http://schemas.microsoft.com/office/drawing/2014/main" id="{5187AE8D-452C-557B-25B6-6A20C895FBA7}"/>
               </a:ext>
             </a:extLst>
           </p:cNvPr>
@@ -5710,8 +6172,8 @@
         </p:nvCxnSpPr>
         <p:spPr>
           <a:xfrm>
-            <a:off x="7041357" y="3507265"/>
-            <a:ext cx="0" cy="222533"/>
+            <a:off x="7438232" y="5407033"/>
+            <a:ext cx="0" cy="752475"/>
           </a:xfrm>
           <a:prstGeom prst="line">
             <a:avLst/>
@@ -5741,10 +6203,10 @@
       </p:cxnSp>
       <p:sp>
         <p:nvSpPr>
-          <p:cNvPr id="35" name="ZoneTexte 34">
-            <a:extLst>
-              <a:ext uri="{FF2B5EF4-FFF2-40B4-BE49-F238E27FC236}">
-                <a16:creationId xmlns:a16="http://schemas.microsoft.com/office/drawing/2014/main" id="{5F85A0DB-1794-B3DF-8B88-4B873CA1E84C}"/>
+          <p:cNvPr id="37" name="ZoneTexte 36">
+            <a:extLst>
+              <a:ext uri="{FF2B5EF4-FFF2-40B4-BE49-F238E27FC236}">
+                <a16:creationId xmlns:a16="http://schemas.microsoft.com/office/drawing/2014/main" id="{0E8CBCBE-CD71-9069-5110-9891CC6BCCF1}"/>
               </a:ext>
             </a:extLst>
           </p:cNvPr>
@@ -5753,7 +6215,7 @@
         </p:nvSpPr>
         <p:spPr>
           <a:xfrm>
-            <a:off x="7041357" y="3433865"/>
+            <a:off x="7438232" y="5598604"/>
             <a:ext cx="1794850" cy="369332"/>
           </a:xfrm>
           <a:prstGeom prst="rect">
@@ -5775,17 +6237,46 @@
                   </a:schemeClr>
                 </a:solidFill>
               </a:rPr>
-              <a:t>2 fichiers à la fois</a:t>
-            </a:r>
-          </a:p>
-        </p:txBody>
-      </p:sp>
+              <a:t>6 fichiers à la fois</a:t>
+            </a:r>
+          </a:p>
+        </p:txBody>
+      </p:sp>
+      <p:pic>
+        <p:nvPicPr>
+          <p:cNvPr id="3" name="Image 2">
+            <a:extLst>
+              <a:ext uri="{FF2B5EF4-FFF2-40B4-BE49-F238E27FC236}">
+                <a16:creationId xmlns:a16="http://schemas.microsoft.com/office/drawing/2014/main" id="{62D32E2A-0B53-8B07-41F5-65D431A704E4}"/>
+              </a:ext>
+            </a:extLst>
+          </p:cNvPr>
+          <p:cNvPicPr>
+            <a:picLocks noChangeAspect="1"/>
+          </p:cNvPicPr>
+          <p:nvPr/>
+        </p:nvPicPr>
+        <p:blipFill rotWithShape="1">
+          <a:blip r:embed="rId3"/>
+          <a:srcRect t="42648" r="5353"/>
+          <a:stretch/>
+        </p:blipFill>
+        <p:spPr>
+          <a:xfrm>
+            <a:off x="358368" y="2811891"/>
+            <a:ext cx="9517827" cy="1079700"/>
+          </a:xfrm>
+          <a:prstGeom prst="rect">
+            <a:avLst/>
+          </a:prstGeom>
+        </p:spPr>
+      </p:pic>
       <p:cxnSp>
         <p:nvCxnSpPr>
-          <p:cNvPr id="36" name="Connecteur droit 35">
-            <a:extLst>
-              <a:ext uri="{FF2B5EF4-FFF2-40B4-BE49-F238E27FC236}">
-                <a16:creationId xmlns:a16="http://schemas.microsoft.com/office/drawing/2014/main" id="{5187AE8D-452C-557B-25B6-6A20C895FBA7}"/>
+          <p:cNvPr id="7" name="Connecteur droit 6">
+            <a:extLst>
+              <a:ext uri="{FF2B5EF4-FFF2-40B4-BE49-F238E27FC236}">
+                <a16:creationId xmlns:a16="http://schemas.microsoft.com/office/drawing/2014/main" id="{9410EAD6-CCF7-D889-EA4C-EDF3C61A93C1}"/>
               </a:ext>
             </a:extLst>
           </p:cNvPr>
@@ -5796,8 +6287,8 @@
         </p:nvCxnSpPr>
         <p:spPr>
           <a:xfrm>
-            <a:off x="7041357" y="5488980"/>
-            <a:ext cx="0" cy="752475"/>
+            <a:off x="7591425" y="3506779"/>
+            <a:ext cx="0" cy="222533"/>
           </a:xfrm>
           <a:prstGeom prst="line">
             <a:avLst/>
@@ -5827,10 +6318,10 @@
       </p:cxnSp>
       <p:sp>
         <p:nvSpPr>
-          <p:cNvPr id="37" name="ZoneTexte 36">
-            <a:extLst>
-              <a:ext uri="{FF2B5EF4-FFF2-40B4-BE49-F238E27FC236}">
-                <a16:creationId xmlns:a16="http://schemas.microsoft.com/office/drawing/2014/main" id="{0E8CBCBE-CD71-9069-5110-9891CC6BCCF1}"/>
+          <p:cNvPr id="8" name="ZoneTexte 7">
+            <a:extLst>
+              <a:ext uri="{FF2B5EF4-FFF2-40B4-BE49-F238E27FC236}">
+                <a16:creationId xmlns:a16="http://schemas.microsoft.com/office/drawing/2014/main" id="{2E358E8B-1917-6827-028A-27D3C5BB6A43}"/>
               </a:ext>
             </a:extLst>
           </p:cNvPr>
@@ -5839,7 +6330,7 @@
         </p:nvSpPr>
         <p:spPr>
           <a:xfrm>
-            <a:off x="7041357" y="5680551"/>
+            <a:off x="7591425" y="3433379"/>
             <a:ext cx="1794850" cy="369332"/>
           </a:xfrm>
           <a:prstGeom prst="rect">
@@ -5861,11 +6352,80 @@
                   </a:schemeClr>
                 </a:solidFill>
               </a:rPr>
-              <a:t>6 fichiers à la fois</a:t>
-            </a:r>
-          </a:p>
-        </p:txBody>
-      </p:sp>
+              <a:t>2 fichiers à la fois</a:t>
+            </a:r>
+          </a:p>
+        </p:txBody>
+      </p:sp>
+      <p:pic>
+        <p:nvPicPr>
+          <p:cNvPr id="10" name="Image 9">
+            <a:extLst>
+              <a:ext uri="{FF2B5EF4-FFF2-40B4-BE49-F238E27FC236}">
+                <a16:creationId xmlns:a16="http://schemas.microsoft.com/office/drawing/2014/main" id="{F7AF649B-24F9-A660-2526-8E0EEE281B4C}"/>
+              </a:ext>
+            </a:extLst>
+          </p:cNvPr>
+          <p:cNvPicPr>
+            <a:picLocks noChangeAspect="1"/>
+          </p:cNvPicPr>
+          <p:nvPr/>
+        </p:nvPicPr>
+        <p:blipFill rotWithShape="1">
+          <a:blip r:embed="rId4"/>
+          <a:srcRect l="756"/>
+          <a:stretch/>
+        </p:blipFill>
+        <p:spPr>
+          <a:xfrm>
+            <a:off x="358368" y="4043009"/>
+            <a:ext cx="1125060" cy="200053"/>
+          </a:xfrm>
+          <a:prstGeom prst="rect">
+            <a:avLst/>
+          </a:prstGeom>
+          <a:ln w="19050">
+            <a:solidFill>
+              <a:srgbClr val="C55A11"/>
+            </a:solidFill>
+          </a:ln>
+        </p:spPr>
+      </p:pic>
+      <p:pic>
+        <p:nvPicPr>
+          <p:cNvPr id="14" name="Image 13">
+            <a:extLst>
+              <a:ext uri="{FF2B5EF4-FFF2-40B4-BE49-F238E27FC236}">
+                <a16:creationId xmlns:a16="http://schemas.microsoft.com/office/drawing/2014/main" id="{6FCD21E3-A56B-4187-9D0F-740548D05B93}"/>
+              </a:ext>
+            </a:extLst>
+          </p:cNvPr>
+          <p:cNvPicPr>
+            <a:picLocks noChangeAspect="1"/>
+          </p:cNvPicPr>
+          <p:nvPr/>
+        </p:nvPicPr>
+        <p:blipFill>
+          <a:blip r:embed="rId5"/>
+          <a:stretch>
+            <a:fillRect/>
+          </a:stretch>
+        </p:blipFill>
+        <p:spPr>
+          <a:xfrm>
+            <a:off x="358368" y="6563086"/>
+            <a:ext cx="1133633" cy="181000"/>
+          </a:xfrm>
+          <a:prstGeom prst="rect">
+            <a:avLst/>
+          </a:prstGeom>
+          <a:ln w="19050">
+            <a:solidFill>
+              <a:srgbClr val="C55A11"/>
+            </a:solidFill>
+          </a:ln>
+        </p:spPr>
+      </p:pic>
     </p:spTree>
     <p:extLst>
       <p:ext uri="{BB962C8B-B14F-4D97-AF65-F5344CB8AC3E}">

</xml_diff>

<commit_message>
rename and zip utils
</commit_message>
<xml_diff>
--- a/Tuto_decoup_TWAV.pptx
+++ b/Tuto_decoup_TWAV.pptx
@@ -12,6 +12,7 @@
     <p:sldId id="257" r:id="rId6"/>
     <p:sldId id="260" r:id="rId7"/>
     <p:sldId id="261" r:id="rId8"/>
+    <p:sldId id="264" r:id="rId9"/>
   </p:sldIdLst>
   <p:sldSz cx="12192000" cy="6858000"/>
   <p:notesSz cx="6858000" cy="9144000"/>
@@ -265,7 +266,7 @@
           <a:p>
             <a:fld id="{2A59F47B-E7C1-4F23-BE41-37F7E26DCCF7}" type="datetimeFigureOut">
               <a:rPr lang="fr-FR" smtClean="0"/>
-              <a:t>26/05/2023</a:t>
+              <a:t>09/06/2023</a:t>
             </a:fld>
             <a:endParaRPr lang="fr-FR"/>
           </a:p>
@@ -463,7 +464,7 @@
           <a:p>
             <a:fld id="{2A59F47B-E7C1-4F23-BE41-37F7E26DCCF7}" type="datetimeFigureOut">
               <a:rPr lang="fr-FR" smtClean="0"/>
-              <a:t>26/05/2023</a:t>
+              <a:t>09/06/2023</a:t>
             </a:fld>
             <a:endParaRPr lang="fr-FR"/>
           </a:p>
@@ -671,7 +672,7 @@
           <a:p>
             <a:fld id="{2A59F47B-E7C1-4F23-BE41-37F7E26DCCF7}" type="datetimeFigureOut">
               <a:rPr lang="fr-FR" smtClean="0"/>
-              <a:t>26/05/2023</a:t>
+              <a:t>09/06/2023</a:t>
             </a:fld>
             <a:endParaRPr lang="fr-FR"/>
           </a:p>
@@ -869,7 +870,7 @@
           <a:p>
             <a:fld id="{2A59F47B-E7C1-4F23-BE41-37F7E26DCCF7}" type="datetimeFigureOut">
               <a:rPr lang="fr-FR" smtClean="0"/>
-              <a:t>26/05/2023</a:t>
+              <a:t>09/06/2023</a:t>
             </a:fld>
             <a:endParaRPr lang="fr-FR"/>
           </a:p>
@@ -1144,7 +1145,7 @@
           <a:p>
             <a:fld id="{2A59F47B-E7C1-4F23-BE41-37F7E26DCCF7}" type="datetimeFigureOut">
               <a:rPr lang="fr-FR" smtClean="0"/>
-              <a:t>26/05/2023</a:t>
+              <a:t>09/06/2023</a:t>
             </a:fld>
             <a:endParaRPr lang="fr-FR"/>
           </a:p>
@@ -1409,7 +1410,7 @@
           <a:p>
             <a:fld id="{2A59F47B-E7C1-4F23-BE41-37F7E26DCCF7}" type="datetimeFigureOut">
               <a:rPr lang="fr-FR" smtClean="0"/>
-              <a:t>26/05/2023</a:t>
+              <a:t>09/06/2023</a:t>
             </a:fld>
             <a:endParaRPr lang="fr-FR"/>
           </a:p>
@@ -1821,7 +1822,7 @@
           <a:p>
             <a:fld id="{2A59F47B-E7C1-4F23-BE41-37F7E26DCCF7}" type="datetimeFigureOut">
               <a:rPr lang="fr-FR" smtClean="0"/>
-              <a:t>26/05/2023</a:t>
+              <a:t>09/06/2023</a:t>
             </a:fld>
             <a:endParaRPr lang="fr-FR"/>
           </a:p>
@@ -1962,7 +1963,7 @@
           <a:p>
             <a:fld id="{2A59F47B-E7C1-4F23-BE41-37F7E26DCCF7}" type="datetimeFigureOut">
               <a:rPr lang="fr-FR" smtClean="0"/>
-              <a:t>26/05/2023</a:t>
+              <a:t>09/06/2023</a:t>
             </a:fld>
             <a:endParaRPr lang="fr-FR"/>
           </a:p>
@@ -2075,7 +2076,7 @@
           <a:p>
             <a:fld id="{2A59F47B-E7C1-4F23-BE41-37F7E26DCCF7}" type="datetimeFigureOut">
               <a:rPr lang="fr-FR" smtClean="0"/>
-              <a:t>26/05/2023</a:t>
+              <a:t>09/06/2023</a:t>
             </a:fld>
             <a:endParaRPr lang="fr-FR"/>
           </a:p>
@@ -2386,7 +2387,7 @@
           <a:p>
             <a:fld id="{2A59F47B-E7C1-4F23-BE41-37F7E26DCCF7}" type="datetimeFigureOut">
               <a:rPr lang="fr-FR" smtClean="0"/>
-              <a:t>26/05/2023</a:t>
+              <a:t>09/06/2023</a:t>
             </a:fld>
             <a:endParaRPr lang="fr-FR"/>
           </a:p>
@@ -2674,7 +2675,7 @@
           <a:p>
             <a:fld id="{2A59F47B-E7C1-4F23-BE41-37F7E26DCCF7}" type="datetimeFigureOut">
               <a:rPr lang="fr-FR" smtClean="0"/>
-              <a:t>26/05/2023</a:t>
+              <a:t>09/06/2023</a:t>
             </a:fld>
             <a:endParaRPr lang="fr-FR"/>
           </a:p>
@@ -2915,7 +2916,7 @@
           <a:p>
             <a:fld id="{2A59F47B-E7C1-4F23-BE41-37F7E26DCCF7}" type="datetimeFigureOut">
               <a:rPr lang="fr-FR" smtClean="0"/>
-              <a:t>26/05/2023</a:t>
+              <a:t>09/06/2023</a:t>
             </a:fld>
             <a:endParaRPr lang="fr-FR"/>
           </a:p>
@@ -3443,8 +3444,8 @@
         </p:nvSpPr>
         <p:spPr>
           <a:xfrm>
-            <a:off x="797979" y="2860962"/>
-            <a:ext cx="10111038" cy="1569660"/>
+            <a:off x="797979" y="2530728"/>
+            <a:ext cx="11128431" cy="1846659"/>
           </a:xfrm>
           <a:prstGeom prst="rect">
             <a:avLst/>
@@ -3472,7 +3473,15 @@
             </a:br>
             <a:r>
               <a:rPr lang="fr-FR" dirty="0"/>
-              <a:t>Ce script permet de découper les T.Wav en .Wav quelle que soit l’arborescence de vos dossiers.</a:t>
+              <a:t>Ce script permet de découper les T.Wav en .</a:t>
+            </a:r>
+            <a:r>
+              <a:rPr lang="fr-FR" dirty="0" err="1"/>
+              <a:t>Wav</a:t>
+            </a:r>
+            <a:r>
+              <a:rPr lang="fr-FR" dirty="0"/>
+              <a:t> quelle que soit l’arborescence de vos dossiers.</a:t>
             </a:r>
           </a:p>
           <a:p>
@@ -3484,7 +3493,22 @@
           <a:p>
             <a:r>
               <a:rPr lang="fr-FR" dirty="0"/>
-              <a:t>Le script copie l’arborescence des dossiers contenant des fichiers T.Wav et les remplace par des .Wav</a:t>
+              <a:t>Le script copie l’arborescence des dossiers contenant des fichiers T.Wav et les remplace par des .</a:t>
+            </a:r>
+            <a:r>
+              <a:rPr lang="fr-FR" dirty="0" err="1"/>
+              <a:t>Wav</a:t>
+            </a:r>
+            <a:endParaRPr lang="fr-FR" dirty="0"/>
+          </a:p>
+          <a:p>
+            <a:r>
+              <a:rPr lang="fr-FR" b="1" dirty="0"/>
+              <a:t>Le découpage des T.Wav se fait selon la norme Vigie-Chiro </a:t>
+            </a:r>
+            <a:r>
+              <a:rPr lang="fr-FR" dirty="0"/>
+              <a:t>; les paramètres sont cependant modifiables dans le script</a:t>
             </a:r>
           </a:p>
         </p:txBody>
@@ -3553,6 +3577,51 @@
             <a:r>
               <a:rPr lang="fr-FR" dirty="0"/>
               <a:t> </a:t>
+            </a:r>
+          </a:p>
+        </p:txBody>
+      </p:sp>
+      <p:sp>
+        <p:nvSpPr>
+          <p:cNvPr id="2" name="ZoneTexte 1">
+            <a:extLst>
+              <a:ext uri="{FF2B5EF4-FFF2-40B4-BE49-F238E27FC236}">
+                <a16:creationId xmlns:a16="http://schemas.microsoft.com/office/drawing/2014/main" id="{650AB4D4-AF96-0E92-0734-81BCCF0DB0D6}"/>
+              </a:ext>
+            </a:extLst>
+          </p:cNvPr>
+          <p:cNvSpPr txBox="1"/>
+          <p:nvPr/>
+        </p:nvSpPr>
+        <p:spPr>
+          <a:xfrm>
+            <a:off x="10686968" y="4279745"/>
+            <a:ext cx="1239442" cy="246221"/>
+          </a:xfrm>
+          <a:prstGeom prst="rect">
+            <a:avLst/>
+          </a:prstGeom>
+          <a:noFill/>
+        </p:spPr>
+        <p:txBody>
+          <a:bodyPr wrap="square" rtlCol="0">
+            <a:spAutoFit/>
+          </a:bodyPr>
+          <a:lstStyle/>
+          <a:p>
+            <a:r>
+              <a:rPr lang="fr-FR" sz="1000" dirty="0"/>
+              <a:t>- </a:t>
+            </a:r>
+            <a:r>
+              <a:rPr lang="fr-FR" sz="1000" dirty="0">
+                <a:hlinkClick r:id="rId5" action="ppaction://hlinksldjump"/>
+              </a:rPr>
+              <a:t>cf. dernière diapo</a:t>
+            </a:r>
+            <a:r>
+              <a:rPr lang="fr-FR" sz="1000" dirty="0"/>
+              <a:t> -</a:t>
             </a:r>
           </a:p>
         </p:txBody>
@@ -4552,11 +4621,11 @@
             </a:r>
             <a:r>
               <a:rPr lang="fr-FR" dirty="0" err="1"/>
-              <a:t>TWAV_splitter_main</a:t>
+              <a:t>TWAV_splitter</a:t>
             </a:r>
             <a:r>
               <a:rPr lang="fr-FR" dirty="0"/>
-              <a:t> »</a:t>
+              <a:t>-main »</a:t>
             </a:r>
           </a:p>
         </p:txBody>
@@ -6430,6 +6499,845 @@
     <p:extLst>
       <p:ext uri="{BB962C8B-B14F-4D97-AF65-F5344CB8AC3E}">
         <p14:creationId xmlns:p14="http://schemas.microsoft.com/office/powerpoint/2010/main" val="4004182174"/>
+      </p:ext>
+    </p:extLst>
+  </p:cSld>
+  <p:clrMapOvr>
+    <a:masterClrMapping/>
+  </p:clrMapOvr>
+</p:sld>
+</file>
+
+<file path=ppt/slides/slide8.xml><?xml version="1.0" encoding="utf-8"?>
+<p:sld xmlns:a="http://schemas.openxmlformats.org/drawingml/2006/main" xmlns:r="http://schemas.openxmlformats.org/officeDocument/2006/relationships" xmlns:p="http://schemas.openxmlformats.org/presentationml/2006/main">
+  <p:cSld>
+    <p:spTree>
+      <p:nvGrpSpPr>
+        <p:cNvPr id="1" name=""/>
+        <p:cNvGrpSpPr/>
+        <p:nvPr/>
+      </p:nvGrpSpPr>
+      <p:grpSpPr>
+        <a:xfrm>
+          <a:off x="0" y="0"/>
+          <a:ext cx="0" cy="0"/>
+          <a:chOff x="0" y="0"/>
+          <a:chExt cx="0" cy="0"/>
+        </a:xfrm>
+      </p:grpSpPr>
+      <p:sp>
+        <p:nvSpPr>
+          <p:cNvPr id="48" name="ZoneTexte 47">
+            <a:extLst>
+              <a:ext uri="{FF2B5EF4-FFF2-40B4-BE49-F238E27FC236}">
+                <a16:creationId xmlns:a16="http://schemas.microsoft.com/office/drawing/2014/main" id="{1271ACF4-9CF5-59BC-FE29-C43464A37A2F}"/>
+              </a:ext>
+            </a:extLst>
+          </p:cNvPr>
+          <p:cNvSpPr txBox="1"/>
+          <p:nvPr/>
+        </p:nvSpPr>
+        <p:spPr>
+          <a:xfrm>
+            <a:off x="6618286" y="1706106"/>
+            <a:ext cx="4930721" cy="4955203"/>
+          </a:xfrm>
+          <a:prstGeom prst="rect">
+            <a:avLst/>
+          </a:prstGeom>
+          <a:noFill/>
+        </p:spPr>
+        <p:txBody>
+          <a:bodyPr wrap="square" rtlCol="0">
+            <a:spAutoFit/>
+          </a:bodyPr>
+          <a:lstStyle/>
+          <a:p>
+            <a:pPr algn="just"/>
+            <a:r>
+              <a:rPr lang="fr-FR" dirty="0"/>
+              <a:t>Si vous avez besoin d’utiliser d’autres paramètres, il faudra alors modifier le script :</a:t>
+            </a:r>
+          </a:p>
+          <a:p>
+            <a:pPr algn="just"/>
+            <a:endParaRPr lang="fr-FR" dirty="0"/>
+          </a:p>
+          <a:p>
+            <a:pPr marL="285750" indent="-285750" algn="just">
+              <a:buFont typeface="Arial" panose="020B0604020202020204" pitchFamily="34" charset="0"/>
+              <a:buChar char="•"/>
+            </a:pPr>
+            <a:r>
+              <a:rPr lang="fr-FR" dirty="0"/>
+              <a:t>Appliquer les prérequis et l’étape 1 (</a:t>
+            </a:r>
+            <a:r>
+              <a:rPr lang="fr-FR" dirty="0">
+                <a:hlinkClick r:id="rId2" action="ppaction://hlinksldjump"/>
+              </a:rPr>
+              <a:t>diapos 2-3</a:t>
+            </a:r>
+            <a:r>
+              <a:rPr lang="fr-FR" dirty="0"/>
+              <a:t>)</a:t>
+            </a:r>
+          </a:p>
+          <a:p>
+            <a:pPr marL="285750" indent="-285750" algn="just">
+              <a:buFont typeface="Arial" panose="020B0604020202020204" pitchFamily="34" charset="0"/>
+              <a:buChar char="•"/>
+            </a:pPr>
+            <a:r>
+              <a:rPr lang="fr-FR" dirty="0"/>
+              <a:t>Ouvrez le dossier « </a:t>
+            </a:r>
+            <a:r>
+              <a:rPr lang="fr-FR" dirty="0" err="1"/>
+              <a:t>TWAV_splitter</a:t>
+            </a:r>
+            <a:r>
+              <a:rPr lang="fr-FR" dirty="0"/>
+              <a:t>-main »</a:t>
+            </a:r>
+          </a:p>
+          <a:p>
+            <a:pPr marL="285750" indent="-285750" algn="just">
+              <a:buFont typeface="Arial" panose="020B0604020202020204" pitchFamily="34" charset="0"/>
+              <a:buChar char="•"/>
+            </a:pPr>
+            <a:r>
+              <a:rPr lang="fr-FR" dirty="0"/>
+              <a:t>Ouvrez le dossier « AudioMoth-</a:t>
+            </a:r>
+            <a:r>
+              <a:rPr lang="fr-FR" dirty="0" err="1"/>
+              <a:t>Utils</a:t>
+            </a:r>
+            <a:r>
+              <a:rPr lang="fr-FR" dirty="0"/>
+              <a:t>-master »</a:t>
+            </a:r>
+          </a:p>
+          <a:p>
+            <a:pPr marL="285750" indent="-285750" algn="just">
+              <a:buFont typeface="Arial" panose="020B0604020202020204" pitchFamily="34" charset="0"/>
+              <a:buChar char="•"/>
+            </a:pPr>
+            <a:r>
+              <a:rPr lang="fr-FR" dirty="0"/>
+              <a:t>Ouvrez le fichier JavaScript « _Expand.js » avec NotePade++, un équivalent ou le Bloc Notes</a:t>
+            </a:r>
+          </a:p>
+          <a:p>
+            <a:pPr marL="285750" indent="-285750" algn="just">
+              <a:buFont typeface="Arial" panose="020B0604020202020204" pitchFamily="34" charset="0"/>
+              <a:buChar char="•"/>
+            </a:pPr>
+            <a:endParaRPr lang="fr-FR" dirty="0"/>
+          </a:p>
+          <a:p>
+            <a:pPr marL="285750" indent="-285750" algn="just">
+              <a:buFont typeface="Arial" panose="020B0604020202020204" pitchFamily="34" charset="0"/>
+              <a:buChar char="•"/>
+            </a:pPr>
+            <a:r>
+              <a:rPr lang="fr-FR" dirty="0"/>
+              <a:t>Vers la fin du script (ligne 46) vous trouverez les variables à modifier : </a:t>
+            </a:r>
+            <a:r>
+              <a:rPr lang="fr-FR" sz="1000" dirty="0">
+                <a:solidFill>
+                  <a:schemeClr val="bg1">
+                    <a:lumMod val="65000"/>
+                  </a:schemeClr>
+                </a:solidFill>
+              </a:rPr>
+              <a:t>à noter que generateSilentFiles ne peut être utiliser qu’avec ‘DURATION’ et aligToSecondTransitions qu’avec ‘EVENT’</a:t>
+            </a:r>
+          </a:p>
+          <a:p>
+            <a:pPr marL="285750" indent="-285750" algn="just">
+              <a:buFont typeface="Arial" panose="020B0604020202020204" pitchFamily="34" charset="0"/>
+              <a:buChar char="•"/>
+            </a:pPr>
+            <a:endParaRPr lang="fr-FR" dirty="0"/>
+          </a:p>
+          <a:p>
+            <a:pPr marL="285750" indent="-285750" algn="just">
+              <a:buFont typeface="Arial" panose="020B0604020202020204" pitchFamily="34" charset="0"/>
+              <a:buChar char="•"/>
+            </a:pPr>
+            <a:endParaRPr lang="fr-FR" dirty="0"/>
+          </a:p>
+          <a:p>
+            <a:pPr marL="285750" indent="-285750" algn="just">
+              <a:buFont typeface="Arial" panose="020B0604020202020204" pitchFamily="34" charset="0"/>
+              <a:buChar char="•"/>
+            </a:pPr>
+            <a:endParaRPr lang="fr-FR" dirty="0"/>
+          </a:p>
+          <a:p>
+            <a:pPr marL="285750" indent="-285750" algn="just">
+              <a:buFont typeface="Arial" panose="020B0604020202020204" pitchFamily="34" charset="0"/>
+              <a:buChar char="•"/>
+            </a:pPr>
+            <a:endParaRPr lang="fr-FR" dirty="0"/>
+          </a:p>
+          <a:p>
+            <a:pPr marL="285750" indent="-285750" algn="just">
+              <a:buFont typeface="Arial" panose="020B0604020202020204" pitchFamily="34" charset="0"/>
+              <a:buChar char="•"/>
+            </a:pPr>
+            <a:r>
+              <a:rPr lang="fr-FR" dirty="0"/>
+              <a:t>Sauvegarder au format JavaScript (.</a:t>
+            </a:r>
+            <a:r>
+              <a:rPr lang="fr-FR" dirty="0" err="1"/>
+              <a:t>js</a:t>
+            </a:r>
+            <a:r>
+              <a:rPr lang="fr-FR" dirty="0"/>
+              <a:t>)</a:t>
+            </a:r>
+          </a:p>
+          <a:p>
+            <a:pPr marL="285750" indent="-285750" algn="just">
+              <a:buFont typeface="Arial" panose="020B0604020202020204" pitchFamily="34" charset="0"/>
+              <a:buChar char="•"/>
+            </a:pPr>
+            <a:r>
+              <a:rPr lang="fr-FR" dirty="0"/>
+              <a:t>Reprenez à partir de l’étape 2 (</a:t>
+            </a:r>
+            <a:r>
+              <a:rPr lang="fr-FR" dirty="0">
+                <a:hlinkClick r:id="rId3" action="ppaction://hlinksldjump"/>
+              </a:rPr>
+              <a:t>diapo 4</a:t>
+            </a:r>
+            <a:r>
+              <a:rPr lang="fr-FR" dirty="0"/>
+              <a:t>)</a:t>
+            </a:r>
+          </a:p>
+        </p:txBody>
+      </p:sp>
+      <p:sp>
+        <p:nvSpPr>
+          <p:cNvPr id="4" name="ZoneTexte 3">
+            <a:extLst>
+              <a:ext uri="{FF2B5EF4-FFF2-40B4-BE49-F238E27FC236}">
+                <a16:creationId xmlns:a16="http://schemas.microsoft.com/office/drawing/2014/main" id="{FFC0B41D-2DB7-BE19-9438-27951A996382}"/>
+              </a:ext>
+            </a:extLst>
+          </p:cNvPr>
+          <p:cNvSpPr txBox="1"/>
+          <p:nvPr/>
+        </p:nvSpPr>
+        <p:spPr>
+          <a:xfrm>
+            <a:off x="504203" y="688885"/>
+            <a:ext cx="6150595" cy="461665"/>
+          </a:xfrm>
+          <a:prstGeom prst="rect">
+            <a:avLst/>
+          </a:prstGeom>
+          <a:noFill/>
+        </p:spPr>
+        <p:txBody>
+          <a:bodyPr wrap="none" rtlCol="0">
+            <a:spAutoFit/>
+          </a:bodyPr>
+          <a:lstStyle/>
+          <a:p>
+            <a:r>
+              <a:rPr lang="fr-FR" sz="2400" b="1" dirty="0"/>
+              <a:t>Modifier les paramètres de découpe des </a:t>
+            </a:r>
+            <a:r>
+              <a:rPr lang="fr-FR" sz="2400" b="1" dirty="0" err="1"/>
+              <a:t>T.Wav</a:t>
+            </a:r>
+            <a:endParaRPr lang="fr-FR" sz="2400" dirty="0"/>
+          </a:p>
+        </p:txBody>
+      </p:sp>
+      <p:sp>
+        <p:nvSpPr>
+          <p:cNvPr id="6" name="ZoneTexte 5">
+            <a:extLst>
+              <a:ext uri="{FF2B5EF4-FFF2-40B4-BE49-F238E27FC236}">
+                <a16:creationId xmlns:a16="http://schemas.microsoft.com/office/drawing/2014/main" id="{079C51D9-AE43-745A-A800-837076E435BF}"/>
+              </a:ext>
+            </a:extLst>
+          </p:cNvPr>
+          <p:cNvSpPr txBox="1"/>
+          <p:nvPr/>
+        </p:nvSpPr>
+        <p:spPr>
+          <a:xfrm>
+            <a:off x="504203" y="1150550"/>
+            <a:ext cx="7532127" cy="369332"/>
+          </a:xfrm>
+          <a:prstGeom prst="rect">
+            <a:avLst/>
+          </a:prstGeom>
+          <a:noFill/>
+        </p:spPr>
+        <p:txBody>
+          <a:bodyPr wrap="none" rtlCol="0">
+            <a:spAutoFit/>
+          </a:bodyPr>
+          <a:lstStyle/>
+          <a:p>
+            <a:r>
+              <a:rPr lang="fr-FR" dirty="0">
+                <a:solidFill>
+                  <a:srgbClr val="FF0000"/>
+                </a:solidFill>
+              </a:rPr>
+              <a:t>Attention, à ne </a:t>
+            </a:r>
+            <a:r>
+              <a:rPr lang="fr-FR" b="1" dirty="0">
+                <a:solidFill>
+                  <a:srgbClr val="FF0000"/>
+                </a:solidFill>
+              </a:rPr>
+              <a:t>PAS</a:t>
+            </a:r>
+            <a:r>
+              <a:rPr lang="fr-FR" dirty="0">
+                <a:solidFill>
+                  <a:srgbClr val="FF0000"/>
+                </a:solidFill>
+              </a:rPr>
+              <a:t> faire si vous souhaiter déposer vos données sur Vigie-</a:t>
+            </a:r>
+            <a:r>
+              <a:rPr lang="fr-FR" dirty="0" err="1">
+                <a:solidFill>
+                  <a:srgbClr val="FF0000"/>
+                </a:solidFill>
+              </a:rPr>
+              <a:t>Chrio</a:t>
+            </a:r>
+            <a:endParaRPr lang="fr-FR" dirty="0">
+              <a:solidFill>
+                <a:srgbClr val="FF0000"/>
+              </a:solidFill>
+            </a:endParaRPr>
+          </a:p>
+        </p:txBody>
+      </p:sp>
+      <p:grpSp>
+        <p:nvGrpSpPr>
+          <p:cNvPr id="11" name="Groupe 10">
+            <a:extLst>
+              <a:ext uri="{FF2B5EF4-FFF2-40B4-BE49-F238E27FC236}">
+                <a16:creationId xmlns:a16="http://schemas.microsoft.com/office/drawing/2014/main" id="{0CF602F4-6025-11A9-9CDA-4A7BBC22333B}"/>
+              </a:ext>
+            </a:extLst>
+          </p:cNvPr>
+          <p:cNvGrpSpPr/>
+          <p:nvPr/>
+        </p:nvGrpSpPr>
+        <p:grpSpPr>
+          <a:xfrm>
+            <a:off x="1289504" y="1706106"/>
+            <a:ext cx="3429622" cy="3934336"/>
+            <a:chOff x="5876925" y="507205"/>
+            <a:chExt cx="5113626" cy="5866163"/>
+          </a:xfrm>
+        </p:grpSpPr>
+        <p:pic>
+          <p:nvPicPr>
+            <p:cNvPr id="12" name="Image 11">
+              <a:extLst>
+                <a:ext uri="{FF2B5EF4-FFF2-40B4-BE49-F238E27FC236}">
+                  <a16:creationId xmlns:a16="http://schemas.microsoft.com/office/drawing/2014/main" id="{B1861ECE-05E1-67B7-AF05-99A02456E9AA}"/>
+                </a:ext>
+              </a:extLst>
+            </p:cNvPr>
+            <p:cNvPicPr>
+              <a:picLocks noChangeAspect="1"/>
+            </p:cNvPicPr>
+            <p:nvPr/>
+          </p:nvPicPr>
+          <p:blipFill>
+            <a:blip r:embed="rId4"/>
+            <a:stretch>
+              <a:fillRect/>
+            </a:stretch>
+          </p:blipFill>
+          <p:spPr>
+            <a:xfrm>
+              <a:off x="5876925" y="507205"/>
+              <a:ext cx="5113626" cy="5866163"/>
+            </a:xfrm>
+            <a:prstGeom prst="rect">
+              <a:avLst/>
+            </a:prstGeom>
+            <a:ln>
+              <a:solidFill>
+                <a:srgbClr val="404040"/>
+              </a:solidFill>
+            </a:ln>
+          </p:spPr>
+        </p:pic>
+        <p:sp>
+          <p:nvSpPr>
+            <p:cNvPr id="13" name="Ellipse 12">
+              <a:extLst>
+                <a:ext uri="{FF2B5EF4-FFF2-40B4-BE49-F238E27FC236}">
+                  <a16:creationId xmlns:a16="http://schemas.microsoft.com/office/drawing/2014/main" id="{ADB64434-093A-3E87-1D83-F773F38A8F84}"/>
+                </a:ext>
+              </a:extLst>
+            </p:cNvPr>
+            <p:cNvSpPr/>
+            <p:nvPr/>
+          </p:nvSpPr>
+          <p:spPr>
+            <a:xfrm>
+              <a:off x="9207374" y="905346"/>
+              <a:ext cx="977775" cy="298765"/>
+            </a:xfrm>
+            <a:prstGeom prst="ellipse">
+              <a:avLst/>
+            </a:prstGeom>
+            <a:noFill/>
+            <a:ln w="38100">
+              <a:solidFill>
+                <a:srgbClr val="FF0000"/>
+              </a:solidFill>
+            </a:ln>
+          </p:spPr>
+          <p:style>
+            <a:lnRef idx="2">
+              <a:schemeClr val="accent1">
+                <a:shade val="50000"/>
+              </a:schemeClr>
+            </a:lnRef>
+            <a:fillRef idx="1">
+              <a:schemeClr val="accent1"/>
+            </a:fillRef>
+            <a:effectRef idx="0">
+              <a:schemeClr val="accent1"/>
+            </a:effectRef>
+            <a:fontRef idx="minor">
+              <a:schemeClr val="lt1"/>
+            </a:fontRef>
+          </p:style>
+          <p:txBody>
+            <a:bodyPr rtlCol="0" anchor="ctr"/>
+            <a:lstStyle/>
+            <a:p>
+              <a:pPr algn="ctr"/>
+              <a:endParaRPr lang="fr-FR"/>
+            </a:p>
+          </p:txBody>
+        </p:sp>
+        <p:sp>
+          <p:nvSpPr>
+            <p:cNvPr id="14" name="Ellipse 13">
+              <a:extLst>
+                <a:ext uri="{FF2B5EF4-FFF2-40B4-BE49-F238E27FC236}">
+                  <a16:creationId xmlns:a16="http://schemas.microsoft.com/office/drawing/2014/main" id="{95402DD9-83F6-0F2A-3092-BFA4CED75FB3}"/>
+                </a:ext>
+              </a:extLst>
+            </p:cNvPr>
+            <p:cNvSpPr/>
+            <p:nvPr/>
+          </p:nvSpPr>
+          <p:spPr>
+            <a:xfrm>
+              <a:off x="7849355" y="1584356"/>
+              <a:ext cx="371192" cy="588475"/>
+            </a:xfrm>
+            <a:prstGeom prst="ellipse">
+              <a:avLst/>
+            </a:prstGeom>
+            <a:noFill/>
+            <a:ln w="38100">
+              <a:solidFill>
+                <a:srgbClr val="FF0000"/>
+              </a:solidFill>
+            </a:ln>
+          </p:spPr>
+          <p:style>
+            <a:lnRef idx="2">
+              <a:schemeClr val="accent1">
+                <a:shade val="50000"/>
+              </a:schemeClr>
+            </a:lnRef>
+            <a:fillRef idx="1">
+              <a:schemeClr val="accent1"/>
+            </a:fillRef>
+            <a:effectRef idx="0">
+              <a:schemeClr val="accent1"/>
+            </a:effectRef>
+            <a:fontRef idx="minor">
+              <a:schemeClr val="lt1"/>
+            </a:fontRef>
+          </p:style>
+          <p:txBody>
+            <a:bodyPr rtlCol="0" anchor="ctr"/>
+            <a:lstStyle/>
+            <a:p>
+              <a:pPr algn="ctr"/>
+              <a:endParaRPr lang="fr-FR"/>
+            </a:p>
+          </p:txBody>
+        </p:sp>
+        <p:sp>
+          <p:nvSpPr>
+            <p:cNvPr id="15" name="Ellipse 14">
+              <a:extLst>
+                <a:ext uri="{FF2B5EF4-FFF2-40B4-BE49-F238E27FC236}">
+                  <a16:creationId xmlns:a16="http://schemas.microsoft.com/office/drawing/2014/main" id="{E1992D3D-FD11-0BC5-7737-BF2905A24B52}"/>
+                </a:ext>
+              </a:extLst>
+            </p:cNvPr>
+            <p:cNvSpPr/>
+            <p:nvPr/>
+          </p:nvSpPr>
+          <p:spPr>
+            <a:xfrm>
+              <a:off x="10500795" y="1348964"/>
+              <a:ext cx="271604" cy="271604"/>
+            </a:xfrm>
+            <a:prstGeom prst="ellipse">
+              <a:avLst/>
+            </a:prstGeom>
+            <a:noFill/>
+            <a:ln w="38100">
+              <a:solidFill>
+                <a:srgbClr val="FF0000"/>
+              </a:solidFill>
+            </a:ln>
+          </p:spPr>
+          <p:style>
+            <a:lnRef idx="2">
+              <a:schemeClr val="accent1">
+                <a:shade val="50000"/>
+              </a:schemeClr>
+            </a:lnRef>
+            <a:fillRef idx="1">
+              <a:schemeClr val="accent1"/>
+            </a:fillRef>
+            <a:effectRef idx="0">
+              <a:schemeClr val="accent1"/>
+            </a:effectRef>
+            <a:fontRef idx="minor">
+              <a:schemeClr val="lt1"/>
+            </a:fontRef>
+          </p:style>
+          <p:txBody>
+            <a:bodyPr rtlCol="0" anchor="ctr"/>
+            <a:lstStyle/>
+            <a:p>
+              <a:pPr algn="ctr"/>
+              <a:endParaRPr lang="fr-FR"/>
+            </a:p>
+          </p:txBody>
+        </p:sp>
+      </p:grpSp>
+      <p:sp>
+        <p:nvSpPr>
+          <p:cNvPr id="16" name="ZoneTexte 15">
+            <a:extLst>
+              <a:ext uri="{FF2B5EF4-FFF2-40B4-BE49-F238E27FC236}">
+                <a16:creationId xmlns:a16="http://schemas.microsoft.com/office/drawing/2014/main" id="{E1E5016F-33AD-73A3-696F-0EAFA992AD06}"/>
+              </a:ext>
+            </a:extLst>
+          </p:cNvPr>
+          <p:cNvSpPr txBox="1"/>
+          <p:nvPr/>
+        </p:nvSpPr>
+        <p:spPr>
+          <a:xfrm>
+            <a:off x="1142378" y="5743330"/>
+            <a:ext cx="3723873" cy="923330"/>
+          </a:xfrm>
+          <a:prstGeom prst="rect">
+            <a:avLst/>
+          </a:prstGeom>
+          <a:noFill/>
+        </p:spPr>
+        <p:txBody>
+          <a:bodyPr wrap="square" rtlCol="0">
+            <a:spAutoFit/>
+          </a:bodyPr>
+          <a:lstStyle/>
+          <a:p>
+            <a:pPr algn="ctr"/>
+            <a:r>
+              <a:rPr lang="fr-FR" dirty="0"/>
+              <a:t>Voici les paramètres de l’application utilisés par défaut par le script.</a:t>
+            </a:r>
+          </a:p>
+          <a:p>
+            <a:pPr algn="ctr"/>
+            <a:r>
+              <a:rPr lang="fr-FR" dirty="0"/>
+              <a:t>Ce sont ceux indiqués par Vigie-Chiro.</a:t>
+            </a:r>
+          </a:p>
+        </p:txBody>
+      </p:sp>
+      <p:cxnSp>
+        <p:nvCxnSpPr>
+          <p:cNvPr id="20" name="Connecteur droit 19">
+            <a:extLst>
+              <a:ext uri="{FF2B5EF4-FFF2-40B4-BE49-F238E27FC236}">
+                <a16:creationId xmlns:a16="http://schemas.microsoft.com/office/drawing/2014/main" id="{DE040753-A4EF-6BCC-D664-F89AE78280C4}"/>
+              </a:ext>
+            </a:extLst>
+          </p:cNvPr>
+          <p:cNvCxnSpPr>
+            <a:cxnSpLocks/>
+          </p:cNvCxnSpPr>
+          <p:nvPr/>
+        </p:nvCxnSpPr>
+        <p:spPr>
+          <a:xfrm>
+            <a:off x="6096000" y="1973132"/>
+            <a:ext cx="0" cy="4341943"/>
+          </a:xfrm>
+          <a:prstGeom prst="line">
+            <a:avLst/>
+          </a:prstGeom>
+          <a:ln w="38100">
+            <a:solidFill>
+              <a:schemeClr val="tx1"/>
+            </a:solidFill>
+          </a:ln>
+        </p:spPr>
+        <p:style>
+          <a:lnRef idx="1">
+            <a:schemeClr val="accent1"/>
+          </a:lnRef>
+          <a:fillRef idx="0">
+            <a:schemeClr val="accent1"/>
+          </a:fillRef>
+          <a:effectRef idx="0">
+            <a:schemeClr val="accent1"/>
+          </a:effectRef>
+          <a:fontRef idx="minor">
+            <a:schemeClr val="tx1"/>
+          </a:fontRef>
+        </p:style>
+      </p:cxnSp>
+      <p:pic>
+        <p:nvPicPr>
+          <p:cNvPr id="31" name="Image 30">
+            <a:extLst>
+              <a:ext uri="{FF2B5EF4-FFF2-40B4-BE49-F238E27FC236}">
+                <a16:creationId xmlns:a16="http://schemas.microsoft.com/office/drawing/2014/main" id="{A210DDDE-B629-F222-B628-21A58EE370FB}"/>
+              </a:ext>
+            </a:extLst>
+          </p:cNvPr>
+          <p:cNvPicPr>
+            <a:picLocks noChangeAspect="1"/>
+          </p:cNvPicPr>
+          <p:nvPr/>
+        </p:nvPicPr>
+        <p:blipFill rotWithShape="1">
+          <a:blip r:embed="rId5"/>
+          <a:srcRect t="3186" b="-1"/>
+          <a:stretch/>
+        </p:blipFill>
+        <p:spPr>
+          <a:xfrm>
+            <a:off x="6338730" y="5115953"/>
+            <a:ext cx="5489835" cy="656819"/>
+          </a:xfrm>
+          <a:prstGeom prst="rect">
+            <a:avLst/>
+          </a:prstGeom>
+          <a:ln>
+            <a:solidFill>
+              <a:schemeClr val="tx1"/>
+            </a:solidFill>
+          </a:ln>
+        </p:spPr>
+      </p:pic>
+      <p:cxnSp>
+        <p:nvCxnSpPr>
+          <p:cNvPr id="33" name="Connecteur droit avec flèche 32">
+            <a:extLst>
+              <a:ext uri="{FF2B5EF4-FFF2-40B4-BE49-F238E27FC236}">
+                <a16:creationId xmlns:a16="http://schemas.microsoft.com/office/drawing/2014/main" id="{4C275149-938F-BE01-FDFD-03966F6EF5D4}"/>
+              </a:ext>
+            </a:extLst>
+          </p:cNvPr>
+          <p:cNvCxnSpPr>
+            <a:cxnSpLocks/>
+          </p:cNvCxnSpPr>
+          <p:nvPr/>
+        </p:nvCxnSpPr>
+        <p:spPr>
+          <a:xfrm>
+            <a:off x="4572815" y="4341019"/>
+            <a:ext cx="2242323" cy="866761"/>
+          </a:xfrm>
+          <a:prstGeom prst="straightConnector1">
+            <a:avLst/>
+          </a:prstGeom>
+          <a:ln>
+            <a:tailEnd type="triangle"/>
+          </a:ln>
+        </p:spPr>
+        <p:style>
+          <a:lnRef idx="1">
+            <a:schemeClr val="accent2"/>
+          </a:lnRef>
+          <a:fillRef idx="0">
+            <a:schemeClr val="accent2"/>
+          </a:fillRef>
+          <a:effectRef idx="0">
+            <a:schemeClr val="accent2"/>
+          </a:effectRef>
+          <a:fontRef idx="minor">
+            <a:schemeClr val="tx1"/>
+          </a:fontRef>
+        </p:style>
+      </p:cxnSp>
+      <p:cxnSp>
+        <p:nvCxnSpPr>
+          <p:cNvPr id="36" name="Connecteur droit avec flèche 35">
+            <a:extLst>
+              <a:ext uri="{FF2B5EF4-FFF2-40B4-BE49-F238E27FC236}">
+                <a16:creationId xmlns:a16="http://schemas.microsoft.com/office/drawing/2014/main" id="{E6BB645A-660F-5023-D8C2-9FCB7940A4F4}"/>
+              </a:ext>
+            </a:extLst>
+          </p:cNvPr>
+          <p:cNvCxnSpPr>
+            <a:cxnSpLocks/>
+          </p:cNvCxnSpPr>
+          <p:nvPr/>
+        </p:nvCxnSpPr>
+        <p:spPr>
+          <a:xfrm>
+            <a:off x="4521070" y="2946993"/>
+            <a:ext cx="2294068" cy="2750486"/>
+          </a:xfrm>
+          <a:prstGeom prst="straightConnector1">
+            <a:avLst/>
+          </a:prstGeom>
+          <a:ln>
+            <a:solidFill>
+              <a:srgbClr val="00CCFF"/>
+            </a:solidFill>
+            <a:tailEnd type="triangle"/>
+          </a:ln>
+        </p:spPr>
+        <p:style>
+          <a:lnRef idx="1">
+            <a:schemeClr val="accent1"/>
+          </a:lnRef>
+          <a:fillRef idx="0">
+            <a:schemeClr val="accent1"/>
+          </a:fillRef>
+          <a:effectRef idx="0">
+            <a:schemeClr val="accent1"/>
+          </a:effectRef>
+          <a:fontRef idx="minor">
+            <a:schemeClr val="tx1"/>
+          </a:fontRef>
+        </p:style>
+      </p:cxnSp>
+      <p:cxnSp>
+        <p:nvCxnSpPr>
+          <p:cNvPr id="38" name="Connecteur droit avec flèche 37">
+            <a:extLst>
+              <a:ext uri="{FF2B5EF4-FFF2-40B4-BE49-F238E27FC236}">
+                <a16:creationId xmlns:a16="http://schemas.microsoft.com/office/drawing/2014/main" id="{CA671BC2-7560-DED2-3FA5-94FB85BAB665}"/>
+              </a:ext>
+            </a:extLst>
+          </p:cNvPr>
+          <p:cNvCxnSpPr>
+            <a:cxnSpLocks/>
+          </p:cNvCxnSpPr>
+          <p:nvPr/>
+        </p:nvCxnSpPr>
+        <p:spPr>
+          <a:xfrm>
+            <a:off x="3045619" y="2195791"/>
+            <a:ext cx="3769519" cy="3133447"/>
+          </a:xfrm>
+          <a:prstGeom prst="straightConnector1">
+            <a:avLst/>
+          </a:prstGeom>
+          <a:ln>
+            <a:tailEnd type="triangle"/>
+          </a:ln>
+        </p:spPr>
+        <p:style>
+          <a:lnRef idx="1">
+            <a:schemeClr val="accent4"/>
+          </a:lnRef>
+          <a:fillRef idx="0">
+            <a:schemeClr val="accent4"/>
+          </a:fillRef>
+          <a:effectRef idx="0">
+            <a:schemeClr val="accent4"/>
+          </a:effectRef>
+          <a:fontRef idx="minor">
+            <a:schemeClr val="tx1"/>
+          </a:fontRef>
+        </p:style>
+      </p:cxnSp>
+      <p:cxnSp>
+        <p:nvCxnSpPr>
+          <p:cNvPr id="44" name="Connecteur droit avec flèche 43">
+            <a:extLst>
+              <a:ext uri="{FF2B5EF4-FFF2-40B4-BE49-F238E27FC236}">
+                <a16:creationId xmlns:a16="http://schemas.microsoft.com/office/drawing/2014/main" id="{1A4609CB-10B4-5A33-A118-ECD36BA084AB}"/>
+              </a:ext>
+            </a:extLst>
+          </p:cNvPr>
+          <p:cNvCxnSpPr>
+            <a:cxnSpLocks/>
+          </p:cNvCxnSpPr>
+          <p:nvPr/>
+        </p:nvCxnSpPr>
+        <p:spPr>
+          <a:xfrm>
+            <a:off x="2870955" y="2760769"/>
+            <a:ext cx="3944183" cy="2683593"/>
+          </a:xfrm>
+          <a:prstGeom prst="straightConnector1">
+            <a:avLst/>
+          </a:prstGeom>
+          <a:ln>
+            <a:solidFill>
+              <a:srgbClr val="7030A0"/>
+            </a:solidFill>
+            <a:tailEnd type="triangle"/>
+          </a:ln>
+        </p:spPr>
+        <p:style>
+          <a:lnRef idx="1">
+            <a:schemeClr val="accent4"/>
+          </a:lnRef>
+          <a:fillRef idx="0">
+            <a:schemeClr val="accent4"/>
+          </a:fillRef>
+          <a:effectRef idx="0">
+            <a:schemeClr val="accent4"/>
+          </a:effectRef>
+          <a:fontRef idx="minor">
+            <a:schemeClr val="tx1"/>
+          </a:fontRef>
+        </p:style>
+      </p:cxnSp>
+    </p:spTree>
+    <p:extLst>
+      <p:ext uri="{BB962C8B-B14F-4D97-AF65-F5344CB8AC3E}">
+        <p14:creationId xmlns:p14="http://schemas.microsoft.com/office/powerpoint/2010/main" val="3272556714"/>
       </p:ext>
     </p:extLst>
   </p:cSld>

</xml_diff>